<commit_message>
deleted columns for one-hot encoding and touched up everything
</commit_message>
<xml_diff>
--- a/presentation.pptx
+++ b/presentation.pptx
@@ -6519,7 +6519,7 @@
         <p:spPr>
           <a:xfrm>
             <a:off x="3530600" y="2397948"/>
-            <a:ext cx="5130800" cy="2062103"/>
+            <a:ext cx="5130800" cy="2554545"/>
           </a:xfrm>
           <a:prstGeom prst="rect">
             <a:avLst/>
@@ -6544,7 +6544,7 @@
           <a:p>
             <a:r>
               <a:rPr lang="en-US" sz="3200" dirty="0"/>
-              <a:t>a fast and reliable formula for home appraisal in King County</a:t>
+              <a:t>help Government of Tanzania predict which of their funded wells will be functioning</a:t>
             </a:r>
           </a:p>
         </p:txBody>
@@ -6593,8 +6593,8 @@
         </p:nvSpPr>
         <p:spPr>
           <a:xfrm>
-            <a:off x="1816100" y="2151727"/>
-            <a:ext cx="8559800" cy="2554545"/>
+            <a:off x="1520414" y="2151727"/>
+            <a:ext cx="9151172" cy="2554545"/>
           </a:xfrm>
           <a:prstGeom prst="rect">
             <a:avLst/>
@@ -6623,7 +6623,7 @@
             </a:pPr>
             <a:r>
               <a:rPr lang="en-US" sz="3200" dirty="0"/>
-              <a:t>roughly 30,000 home sales</a:t>
+              <a:t>over 9,000 wells funded by Tanzanian Government</a:t>
             </a:r>
           </a:p>
           <a:p>
@@ -6633,7 +6633,7 @@
             </a:pPr>
             <a:r>
               <a:rPr lang="en-US" sz="3200" dirty="0"/>
-              <a:t>June 10, 2021 — June 10, 2022</a:t>
+              <a:t>installed [INSERT DATES HERE]</a:t>
             </a:r>
           </a:p>
           <a:p>
@@ -6643,7 +6643,7 @@
             </a:pPr>
             <a:r>
               <a:rPr lang="en-US" sz="3200" dirty="0"/>
-              <a:t>King County, Washington, (the Seattle metro area)</a:t>
+              <a:t>MORE DATA??</a:t>
             </a:r>
           </a:p>
         </p:txBody>

</xml_diff>

<commit_message>
last push before presentation
</commit_message>
<xml_diff>
--- a/presentation.pptx
+++ b/presentation.pptx
@@ -22,7 +22,8 @@
     <p:sldId id="288" r:id="rId16"/>
     <p:sldId id="289" r:id="rId17"/>
     <p:sldId id="290" r:id="rId18"/>
-    <p:sldId id="264" r:id="rId19"/>
+    <p:sldId id="291" r:id="rId19"/>
+    <p:sldId id="264" r:id="rId20"/>
   </p:sldIdLst>
   <p:sldSz cx="12192000" cy="6858000"/>
   <p:notesSz cx="6858000" cy="9144000"/>
@@ -3564,7 +3565,12 @@
             <p:ph type="ctrTitle"/>
           </p:nvPr>
         </p:nvSpPr>
-        <p:spPr/>
+        <p:spPr>
+          <a:xfrm>
+            <a:off x="1524000" y="258763"/>
+            <a:ext cx="9144000" cy="2387600"/>
+          </a:xfrm>
+        </p:spPr>
         <p:txBody>
           <a:bodyPr>
             <a:normAutofit/>
@@ -3598,7 +3604,7 @@
         </p:nvSpPr>
         <p:spPr>
           <a:xfrm>
-            <a:off x="1524000" y="3879037"/>
+            <a:off x="1524000" y="3015437"/>
             <a:ext cx="9144000" cy="817562"/>
           </a:xfrm>
         </p:spPr>
@@ -3666,6 +3672,113 @@
           </a:p>
         </p:txBody>
       </p:sp>
+      <p:grpSp>
+        <p:nvGrpSpPr>
+          <p:cNvPr id="7" name="Group 6">
+            <a:extLst>
+              <a:ext uri="{FF2B5EF4-FFF2-40B4-BE49-F238E27FC236}">
+                <a16:creationId xmlns:a16="http://schemas.microsoft.com/office/drawing/2014/main" id="{1EE6EB92-D7A0-85F4-AD91-C41BDC859B01}"/>
+              </a:ext>
+            </a:extLst>
+          </p:cNvPr>
+          <p:cNvGrpSpPr/>
+          <p:nvPr/>
+        </p:nvGrpSpPr>
+        <p:grpSpPr>
+          <a:xfrm>
+            <a:off x="5100638" y="3609310"/>
+            <a:ext cx="1990724" cy="1990724"/>
+            <a:chOff x="5100638" y="3609310"/>
+            <a:chExt cx="1990724" cy="1990724"/>
+          </a:xfrm>
+        </p:grpSpPr>
+        <p:pic>
+          <p:nvPicPr>
+            <p:cNvPr id="5" name="Picture 2" descr="Faucet Icon - Free PNG &amp; SVG 2133 - Noun Project">
+              <a:extLst>
+                <a:ext uri="{FF2B5EF4-FFF2-40B4-BE49-F238E27FC236}">
+                  <a16:creationId xmlns:a16="http://schemas.microsoft.com/office/drawing/2014/main" id="{A93D6000-E94F-FE2B-730D-4F3A0B324AC9}"/>
+                </a:ext>
+              </a:extLst>
+            </p:cNvPr>
+            <p:cNvPicPr>
+              <a:picLocks noChangeAspect="1" noChangeArrowheads="1"/>
+            </p:cNvPicPr>
+            <p:nvPr/>
+          </p:nvPicPr>
+          <p:blipFill>
+            <a:blip r:embed="rId2">
+              <a:extLst>
+                <a:ext uri="{28A0092B-C50C-407E-A947-70E740481C1C}">
+                  <a14:useLocalDpi xmlns:a14="http://schemas.microsoft.com/office/drawing/2010/main" val="0"/>
+                </a:ext>
+              </a:extLst>
+            </a:blip>
+            <a:srcRect/>
+            <a:stretch>
+              <a:fillRect/>
+            </a:stretch>
+          </p:blipFill>
+          <p:spPr bwMode="auto">
+            <a:xfrm>
+              <a:off x="5516562" y="4127500"/>
+              <a:ext cx="1143000" cy="1143000"/>
+            </a:xfrm>
+            <a:prstGeom prst="rect">
+              <a:avLst/>
+            </a:prstGeom>
+            <a:noFill/>
+            <a:extLst>
+              <a:ext uri="{909E8E84-426E-40DD-AFC4-6F175D3DCCD1}">
+                <a14:hiddenFill xmlns:a14="http://schemas.microsoft.com/office/drawing/2010/main">
+                  <a:solidFill>
+                    <a:srgbClr val="FFFFFF"/>
+                  </a:solidFill>
+                </a14:hiddenFill>
+              </a:ext>
+            </a:extLst>
+          </p:spPr>
+        </p:pic>
+        <p:pic>
+          <p:nvPicPr>
+            <p:cNvPr id="6" name="Picture 2" descr="Tanzania Icons - Free SVG &amp; PNG Tanzania Images - Noun Project">
+              <a:extLst>
+                <a:ext uri="{FF2B5EF4-FFF2-40B4-BE49-F238E27FC236}">
+                  <a16:creationId xmlns:a16="http://schemas.microsoft.com/office/drawing/2014/main" id="{225351AA-4AF0-A157-AF47-DE1FA3AD5072}"/>
+                </a:ext>
+              </a:extLst>
+            </p:cNvPr>
+            <p:cNvPicPr>
+              <a:picLocks noChangeAspect="1" noChangeArrowheads="1"/>
+            </p:cNvPicPr>
+            <p:nvPr/>
+          </p:nvPicPr>
+          <p:blipFill>
+            <a:blip r:embed="rId3">
+              <a:alphaModFix amt="25000"/>
+              <a:extLst>
+                <a:ext uri="{28A0092B-C50C-407E-A947-70E740481C1C}">
+                  <a14:useLocalDpi xmlns:a14="http://schemas.microsoft.com/office/drawing/2010/main" val="0"/>
+                </a:ext>
+              </a:extLst>
+            </a:blip>
+            <a:srcRect/>
+            <a:stretch>
+              <a:fillRect/>
+            </a:stretch>
+          </p:blipFill>
+          <p:spPr bwMode="auto">
+            <a:xfrm>
+              <a:off x="5100638" y="3609310"/>
+              <a:ext cx="1990724" cy="1990724"/>
+            </a:xfrm>
+            <a:prstGeom prst="rect">
+              <a:avLst/>
+            </a:prstGeom>
+            <a:noFill/>
+          </p:spPr>
+        </p:pic>
+      </p:grpSp>
     </p:spTree>
     <p:extLst>
       <p:ext uri="{BB962C8B-B14F-4D97-AF65-F5344CB8AC3E}">
@@ -5277,6 +5390,9 @@
                     <p:cTn id="3" fill="hold">
                       <p:stCondLst>
                         <p:cond delay="indefinite"/>
+                        <p:cond evt="onBegin" delay="0">
+                          <p:tn val="2"/>
+                        </p:cond>
                       </p:stCondLst>
                       <p:childTnLst>
                         <p:par>
@@ -5286,7 +5402,7 @@
                             </p:stCondLst>
                             <p:childTnLst>
                               <p:par>
-                                <p:cTn id="5" presetID="9" presetClass="entr" presetSubtype="0" fill="hold" grpId="0" nodeType="clickEffect">
+                                <p:cTn id="5" presetID="9" presetClass="entr" presetSubtype="0" fill="hold" grpId="0" nodeType="withEffect">
                                   <p:stCondLst>
                                     <p:cond delay="0"/>
                                   </p:stCondLst>
@@ -5765,6 +5881,9 @@
                     <p:cTn id="3" fill="hold">
                       <p:stCondLst>
                         <p:cond delay="indefinite"/>
+                        <p:cond evt="onBegin" delay="0">
+                          <p:tn val="2"/>
+                        </p:cond>
                       </p:stCondLst>
                       <p:childTnLst>
                         <p:par>
@@ -5774,7 +5893,7 @@
                             </p:stCondLst>
                             <p:childTnLst>
                               <p:par>
-                                <p:cTn id="5" presetID="9" presetClass="entr" presetSubtype="0" fill="hold" grpId="0" nodeType="clickEffect">
+                                <p:cTn id="5" presetID="9" presetClass="entr" presetSubtype="0" fill="hold" grpId="0" nodeType="withEffect">
                                   <p:stCondLst>
                                     <p:cond delay="0"/>
                                   </p:stCondLst>
@@ -6714,6 +6833,41 @@
           </a:p>
         </p:txBody>
       </p:sp>
+      <p:sp>
+        <p:nvSpPr>
+          <p:cNvPr id="8" name="TextBox 7">
+            <a:extLst>
+              <a:ext uri="{FF2B5EF4-FFF2-40B4-BE49-F238E27FC236}">
+                <a16:creationId xmlns:a16="http://schemas.microsoft.com/office/drawing/2014/main" id="{A2670425-B227-0009-4ACC-69BDB375D995}"/>
+              </a:ext>
+            </a:extLst>
+          </p:cNvPr>
+          <p:cNvSpPr txBox="1"/>
+          <p:nvPr/>
+        </p:nvSpPr>
+        <p:spPr>
+          <a:xfrm>
+            <a:off x="2560320" y="5099127"/>
+            <a:ext cx="9022080" cy="584775"/>
+          </a:xfrm>
+          <a:prstGeom prst="rect">
+            <a:avLst/>
+          </a:prstGeom>
+          <a:noFill/>
+        </p:spPr>
+        <p:txBody>
+          <a:bodyPr wrap="square" rtlCol="0">
+            <a:spAutoFit/>
+          </a:bodyPr>
+          <a:lstStyle/>
+          <a:p>
+            <a:r>
+              <a:rPr lang="en-US" sz="3200" dirty="0"/>
+              <a:t>d. wells installed before 1985</a:t>
+            </a:r>
+          </a:p>
+        </p:txBody>
+      </p:sp>
     </p:spTree>
     <p:extLst>
       <p:ext uri="{BB962C8B-B14F-4D97-AF65-F5344CB8AC3E}">
@@ -6944,6 +7098,59 @@
                       </p:childTnLst>
                     </p:cTn>
                   </p:par>
+                  <p:par>
+                    <p:cTn id="23" fill="hold">
+                      <p:stCondLst>
+                        <p:cond delay="indefinite"/>
+                      </p:stCondLst>
+                      <p:childTnLst>
+                        <p:par>
+                          <p:cTn id="24" fill="hold">
+                            <p:stCondLst>
+                              <p:cond delay="0"/>
+                            </p:stCondLst>
+                            <p:childTnLst>
+                              <p:par>
+                                <p:cTn id="25" presetID="9" presetClass="entr" presetSubtype="0" fill="hold" grpId="0" nodeType="clickEffect">
+                                  <p:stCondLst>
+                                    <p:cond delay="0"/>
+                                  </p:stCondLst>
+                                  <p:childTnLst>
+                                    <p:set>
+                                      <p:cBhvr>
+                                        <p:cTn id="26" dur="1" fill="hold">
+                                          <p:stCondLst>
+                                            <p:cond delay="0"/>
+                                          </p:stCondLst>
+                                        </p:cTn>
+                                        <p:tgtEl>
+                                          <p:spTgt spid="8"/>
+                                        </p:tgtEl>
+                                        <p:attrNameLst>
+                                          <p:attrName>style.visibility</p:attrName>
+                                        </p:attrNameLst>
+                                      </p:cBhvr>
+                                      <p:to>
+                                        <p:strVal val="visible"/>
+                                      </p:to>
+                                    </p:set>
+                                    <p:animEffect transition="in" filter="dissolve">
+                                      <p:cBhvr>
+                                        <p:cTn id="27" dur="500"/>
+                                        <p:tgtEl>
+                                          <p:spTgt spid="8"/>
+                                        </p:tgtEl>
+                                      </p:cBhvr>
+                                    </p:animEffect>
+                                  </p:childTnLst>
+                                </p:cTn>
+                              </p:par>
+                            </p:childTnLst>
+                          </p:cTn>
+                        </p:par>
+                      </p:childTnLst>
+                    </p:cTn>
+                  </p:par>
                 </p:childTnLst>
               </p:cTn>
               <p:prevCondLst>
@@ -6970,6 +7177,7 @@
       <p:bldP spid="3" grpId="0"/>
       <p:bldP spid="6" grpId="0"/>
       <p:bldP spid="7" grpId="0"/>
+      <p:bldP spid="8" grpId="0"/>
     </p:bldLst>
   </p:timing>
 </p:sld>
@@ -6994,6 +7202,321 @@
       </p:grpSpPr>
       <p:sp>
         <p:nvSpPr>
+          <p:cNvPr id="4" name="TextBox 3">
+            <a:extLst>
+              <a:ext uri="{FF2B5EF4-FFF2-40B4-BE49-F238E27FC236}">
+                <a16:creationId xmlns:a16="http://schemas.microsoft.com/office/drawing/2014/main" id="{9696B0BF-5DA7-57AD-D5E0-8D7F6962E536}"/>
+              </a:ext>
+            </a:extLst>
+          </p:cNvPr>
+          <p:cNvSpPr txBox="1"/>
+          <p:nvPr/>
+        </p:nvSpPr>
+        <p:spPr>
+          <a:xfrm>
+            <a:off x="1843144" y="784843"/>
+            <a:ext cx="8505712" cy="830997"/>
+          </a:xfrm>
+          <a:prstGeom prst="rect">
+            <a:avLst/>
+          </a:prstGeom>
+          <a:noFill/>
+        </p:spPr>
+        <p:txBody>
+          <a:bodyPr wrap="square" rtlCol="0">
+            <a:spAutoFit/>
+          </a:bodyPr>
+          <a:lstStyle/>
+          <a:p>
+            <a:pPr algn="ctr"/>
+            <a:r>
+              <a:rPr lang="en-US" sz="4800" b="1" u="sng" dirty="0"/>
+              <a:t>Further Inquiry</a:t>
+            </a:r>
+          </a:p>
+        </p:txBody>
+      </p:sp>
+      <p:sp>
+        <p:nvSpPr>
+          <p:cNvPr id="2" name="TextBox 1">
+            <a:extLst>
+              <a:ext uri="{FF2B5EF4-FFF2-40B4-BE49-F238E27FC236}">
+                <a16:creationId xmlns:a16="http://schemas.microsoft.com/office/drawing/2014/main" id="{C5F0D132-A1C2-41E3-2D4E-F5D6D83ABE44}"/>
+              </a:ext>
+            </a:extLst>
+          </p:cNvPr>
+          <p:cNvSpPr txBox="1"/>
+          <p:nvPr/>
+        </p:nvSpPr>
+        <p:spPr>
+          <a:xfrm>
+            <a:off x="1752600" y="2351782"/>
+            <a:ext cx="9022080" cy="1077218"/>
+          </a:xfrm>
+          <a:prstGeom prst="rect">
+            <a:avLst/>
+          </a:prstGeom>
+          <a:noFill/>
+        </p:spPr>
+        <p:txBody>
+          <a:bodyPr wrap="square" rtlCol="0">
+            <a:spAutoFit/>
+          </a:bodyPr>
+          <a:lstStyle/>
+          <a:p>
+            <a:r>
+              <a:rPr lang="en-US" sz="3200" dirty="0"/>
+              <a:t>gather more complete data, particularly in water quantity, waterpoint type, and installer identity</a:t>
+            </a:r>
+          </a:p>
+        </p:txBody>
+      </p:sp>
+      <p:sp>
+        <p:nvSpPr>
+          <p:cNvPr id="3" name="TextBox 2">
+            <a:extLst>
+              <a:ext uri="{FF2B5EF4-FFF2-40B4-BE49-F238E27FC236}">
+                <a16:creationId xmlns:a16="http://schemas.microsoft.com/office/drawing/2014/main" id="{BF2BE612-DC47-F767-CC55-5067E8FF07F1}"/>
+              </a:ext>
+            </a:extLst>
+          </p:cNvPr>
+          <p:cNvSpPr txBox="1"/>
+          <p:nvPr/>
+        </p:nvSpPr>
+        <p:spPr>
+          <a:xfrm>
+            <a:off x="1752600" y="3956127"/>
+            <a:ext cx="7071360" cy="1077218"/>
+          </a:xfrm>
+          <a:prstGeom prst="rect">
+            <a:avLst/>
+          </a:prstGeom>
+          <a:noFill/>
+        </p:spPr>
+        <p:txBody>
+          <a:bodyPr wrap="square" rtlCol="0">
+            <a:spAutoFit/>
+          </a:bodyPr>
+          <a:lstStyle/>
+          <a:p>
+            <a:r>
+              <a:rPr lang="en-US" sz="3200" dirty="0"/>
+              <a:t>acquire data on cost and availability of options</a:t>
+            </a:r>
+          </a:p>
+        </p:txBody>
+      </p:sp>
+      <p:pic>
+        <p:nvPicPr>
+          <p:cNvPr id="5" name="Picture 2" descr="Tanzania Icons - Free SVG &amp; PNG Tanzania Images - Noun Project">
+            <a:extLst>
+              <a:ext uri="{FF2B5EF4-FFF2-40B4-BE49-F238E27FC236}">
+                <a16:creationId xmlns:a16="http://schemas.microsoft.com/office/drawing/2014/main" id="{9D54A84B-A92D-ADBB-F99A-BF0A3DD1A32E}"/>
+              </a:ext>
+            </a:extLst>
+          </p:cNvPr>
+          <p:cNvPicPr>
+            <a:picLocks noChangeAspect="1" noChangeArrowheads="1"/>
+          </p:cNvPicPr>
+          <p:nvPr/>
+        </p:nvPicPr>
+        <p:blipFill>
+          <a:blip r:embed="rId2">
+            <a:alphaModFix amt="25000"/>
+            <a:extLst>
+              <a:ext uri="{28A0092B-C50C-407E-A947-70E740481C1C}">
+                <a14:useLocalDpi xmlns:a14="http://schemas.microsoft.com/office/drawing/2010/main" val="0"/>
+              </a:ext>
+            </a:extLst>
+          </a:blip>
+          <a:srcRect/>
+          <a:stretch>
+            <a:fillRect/>
+          </a:stretch>
+        </p:blipFill>
+        <p:spPr bwMode="auto">
+          <a:xfrm>
+            <a:off x="3081338" y="629572"/>
+            <a:ext cx="5867400" cy="5867400"/>
+          </a:xfrm>
+          <a:prstGeom prst="rect">
+            <a:avLst/>
+          </a:prstGeom>
+          <a:noFill/>
+        </p:spPr>
+      </p:pic>
+    </p:spTree>
+    <p:extLst>
+      <p:ext uri="{BB962C8B-B14F-4D97-AF65-F5344CB8AC3E}">
+        <p14:creationId xmlns:p14="http://schemas.microsoft.com/office/powerpoint/2010/main" val="3118877949"/>
+      </p:ext>
+    </p:extLst>
+  </p:cSld>
+  <p:clrMapOvr>
+    <a:masterClrMapping/>
+  </p:clrMapOvr>
+  <p:timing>
+    <p:tnLst>
+      <p:par>
+        <p:cTn id="1" dur="indefinite" restart="never" nodeType="tmRoot">
+          <p:childTnLst>
+            <p:seq concurrent="1" nextAc="seek">
+              <p:cTn id="2" dur="indefinite" nodeType="mainSeq">
+                <p:childTnLst>
+                  <p:par>
+                    <p:cTn id="3" fill="hold">
+                      <p:stCondLst>
+                        <p:cond delay="indefinite"/>
+                      </p:stCondLst>
+                      <p:childTnLst>
+                        <p:par>
+                          <p:cTn id="4" fill="hold">
+                            <p:stCondLst>
+                              <p:cond delay="0"/>
+                            </p:stCondLst>
+                            <p:childTnLst>
+                              <p:par>
+                                <p:cTn id="5" presetID="9" presetClass="entr" presetSubtype="0" fill="hold" grpId="0" nodeType="clickEffect">
+                                  <p:stCondLst>
+                                    <p:cond delay="0"/>
+                                  </p:stCondLst>
+                                  <p:childTnLst>
+                                    <p:set>
+                                      <p:cBhvr>
+                                        <p:cTn id="6" dur="1" fill="hold">
+                                          <p:stCondLst>
+                                            <p:cond delay="0"/>
+                                          </p:stCondLst>
+                                        </p:cTn>
+                                        <p:tgtEl>
+                                          <p:spTgt spid="2"/>
+                                        </p:tgtEl>
+                                        <p:attrNameLst>
+                                          <p:attrName>style.visibility</p:attrName>
+                                        </p:attrNameLst>
+                                      </p:cBhvr>
+                                      <p:to>
+                                        <p:strVal val="visible"/>
+                                      </p:to>
+                                    </p:set>
+                                    <p:animEffect transition="in" filter="dissolve">
+                                      <p:cBhvr>
+                                        <p:cTn id="7" dur="500"/>
+                                        <p:tgtEl>
+                                          <p:spTgt spid="2"/>
+                                        </p:tgtEl>
+                                      </p:cBhvr>
+                                    </p:animEffect>
+                                  </p:childTnLst>
+                                </p:cTn>
+                              </p:par>
+                            </p:childTnLst>
+                          </p:cTn>
+                        </p:par>
+                      </p:childTnLst>
+                    </p:cTn>
+                  </p:par>
+                  <p:par>
+                    <p:cTn id="8" fill="hold">
+                      <p:stCondLst>
+                        <p:cond delay="indefinite"/>
+                      </p:stCondLst>
+                      <p:childTnLst>
+                        <p:par>
+                          <p:cTn id="9" fill="hold">
+                            <p:stCondLst>
+                              <p:cond delay="0"/>
+                            </p:stCondLst>
+                            <p:childTnLst>
+                              <p:par>
+                                <p:cTn id="10" presetID="9" presetClass="entr" presetSubtype="0" fill="hold" grpId="0" nodeType="clickEffect">
+                                  <p:stCondLst>
+                                    <p:cond delay="0"/>
+                                  </p:stCondLst>
+                                  <p:childTnLst>
+                                    <p:set>
+                                      <p:cBhvr>
+                                        <p:cTn id="11" dur="1" fill="hold">
+                                          <p:stCondLst>
+                                            <p:cond delay="0"/>
+                                          </p:stCondLst>
+                                        </p:cTn>
+                                        <p:tgtEl>
+                                          <p:spTgt spid="3"/>
+                                        </p:tgtEl>
+                                        <p:attrNameLst>
+                                          <p:attrName>style.visibility</p:attrName>
+                                        </p:attrNameLst>
+                                      </p:cBhvr>
+                                      <p:to>
+                                        <p:strVal val="visible"/>
+                                      </p:to>
+                                    </p:set>
+                                    <p:animEffect transition="in" filter="dissolve">
+                                      <p:cBhvr>
+                                        <p:cTn id="12" dur="500"/>
+                                        <p:tgtEl>
+                                          <p:spTgt spid="3"/>
+                                        </p:tgtEl>
+                                      </p:cBhvr>
+                                    </p:animEffect>
+                                  </p:childTnLst>
+                                </p:cTn>
+                              </p:par>
+                            </p:childTnLst>
+                          </p:cTn>
+                        </p:par>
+                      </p:childTnLst>
+                    </p:cTn>
+                  </p:par>
+                </p:childTnLst>
+              </p:cTn>
+              <p:prevCondLst>
+                <p:cond evt="onPrev" delay="0">
+                  <p:tgtEl>
+                    <p:sldTgt/>
+                  </p:tgtEl>
+                </p:cond>
+              </p:prevCondLst>
+              <p:nextCondLst>
+                <p:cond evt="onNext" delay="0">
+                  <p:tgtEl>
+                    <p:sldTgt/>
+                  </p:tgtEl>
+                </p:cond>
+              </p:nextCondLst>
+            </p:seq>
+          </p:childTnLst>
+        </p:cTn>
+      </p:par>
+    </p:tnLst>
+    <p:bldLst>
+      <p:bldP spid="2" grpId="0"/>
+      <p:bldP spid="3" grpId="0"/>
+    </p:bldLst>
+  </p:timing>
+</p:sld>
+</file>
+
+<file path=ppt/slides/slide19.xml><?xml version="1.0" encoding="utf-8"?>
+<p:sld xmlns:a="http://schemas.openxmlformats.org/drawingml/2006/main" xmlns:r="http://schemas.openxmlformats.org/officeDocument/2006/relationships" xmlns:p="http://schemas.openxmlformats.org/presentationml/2006/main">
+  <p:cSld>
+    <p:spTree>
+      <p:nvGrpSpPr>
+        <p:cNvPr id="1" name=""/>
+        <p:cNvGrpSpPr/>
+        <p:nvPr/>
+      </p:nvGrpSpPr>
+      <p:grpSpPr>
+        <a:xfrm>
+          <a:off x="0" y="0"/>
+          <a:ext cx="0" cy="0"/>
+          <a:chOff x="0" y="0"/>
+          <a:chExt cx="0" cy="0"/>
+        </a:xfrm>
+      </p:grpSpPr>
+      <p:sp>
+        <p:nvSpPr>
           <p:cNvPr id="2" name="Title 1">
             <a:extLst>
               <a:ext uri="{FF2B5EF4-FFF2-40B4-BE49-F238E27FC236}">
@@ -7010,7 +7533,7 @@
         </p:nvSpPr>
         <p:spPr>
           <a:xfrm>
-            <a:off x="3444423" y="2834481"/>
+            <a:off x="3444423" y="2466181"/>
             <a:ext cx="5303154" cy="1189037"/>
           </a:xfrm>
         </p:spPr>
@@ -7139,6 +7662,113 @@
           </a:p>
         </p:txBody>
       </p:sp>
+      <p:grpSp>
+        <p:nvGrpSpPr>
+          <p:cNvPr id="3" name="Group 2">
+            <a:extLst>
+              <a:ext uri="{FF2B5EF4-FFF2-40B4-BE49-F238E27FC236}">
+                <a16:creationId xmlns:a16="http://schemas.microsoft.com/office/drawing/2014/main" id="{8E7C2633-30CC-D745-C639-C7FE8DD49D21}"/>
+              </a:ext>
+            </a:extLst>
+          </p:cNvPr>
+          <p:cNvGrpSpPr/>
+          <p:nvPr/>
+        </p:nvGrpSpPr>
+        <p:grpSpPr>
+          <a:xfrm>
+            <a:off x="5100638" y="3609310"/>
+            <a:ext cx="1990724" cy="1990724"/>
+            <a:chOff x="5100638" y="3609310"/>
+            <a:chExt cx="1990724" cy="1990724"/>
+          </a:xfrm>
+        </p:grpSpPr>
+        <p:pic>
+          <p:nvPicPr>
+            <p:cNvPr id="5" name="Picture 2" descr="Faucet Icon - Free PNG &amp; SVG 2133 - Noun Project">
+              <a:extLst>
+                <a:ext uri="{FF2B5EF4-FFF2-40B4-BE49-F238E27FC236}">
+                  <a16:creationId xmlns:a16="http://schemas.microsoft.com/office/drawing/2014/main" id="{2D42B9A8-22FD-3A2A-74A6-CCCFF5FBE133}"/>
+                </a:ext>
+              </a:extLst>
+            </p:cNvPr>
+            <p:cNvPicPr>
+              <a:picLocks noChangeAspect="1" noChangeArrowheads="1"/>
+            </p:cNvPicPr>
+            <p:nvPr/>
+          </p:nvPicPr>
+          <p:blipFill>
+            <a:blip r:embed="rId2">
+              <a:extLst>
+                <a:ext uri="{28A0092B-C50C-407E-A947-70E740481C1C}">
+                  <a14:useLocalDpi xmlns:a14="http://schemas.microsoft.com/office/drawing/2010/main" val="0"/>
+                </a:ext>
+              </a:extLst>
+            </a:blip>
+            <a:srcRect/>
+            <a:stretch>
+              <a:fillRect/>
+            </a:stretch>
+          </p:blipFill>
+          <p:spPr bwMode="auto">
+            <a:xfrm>
+              <a:off x="5516562" y="4127500"/>
+              <a:ext cx="1143000" cy="1143000"/>
+            </a:xfrm>
+            <a:prstGeom prst="rect">
+              <a:avLst/>
+            </a:prstGeom>
+            <a:noFill/>
+            <a:extLst>
+              <a:ext uri="{909E8E84-426E-40DD-AFC4-6F175D3DCCD1}">
+                <a14:hiddenFill xmlns:a14="http://schemas.microsoft.com/office/drawing/2010/main">
+                  <a:solidFill>
+                    <a:srgbClr val="FFFFFF"/>
+                  </a:solidFill>
+                </a14:hiddenFill>
+              </a:ext>
+            </a:extLst>
+          </p:spPr>
+        </p:pic>
+        <p:pic>
+          <p:nvPicPr>
+            <p:cNvPr id="6" name="Picture 2" descr="Tanzania Icons - Free SVG &amp; PNG Tanzania Images - Noun Project">
+              <a:extLst>
+                <a:ext uri="{FF2B5EF4-FFF2-40B4-BE49-F238E27FC236}">
+                  <a16:creationId xmlns:a16="http://schemas.microsoft.com/office/drawing/2014/main" id="{4012348D-0BF9-9B79-735F-A294BE7C2121}"/>
+                </a:ext>
+              </a:extLst>
+            </p:cNvPr>
+            <p:cNvPicPr>
+              <a:picLocks noChangeAspect="1" noChangeArrowheads="1"/>
+            </p:cNvPicPr>
+            <p:nvPr/>
+          </p:nvPicPr>
+          <p:blipFill>
+            <a:blip r:embed="rId3">
+              <a:alphaModFix amt="25000"/>
+              <a:extLst>
+                <a:ext uri="{28A0092B-C50C-407E-A947-70E740481C1C}">
+                  <a14:useLocalDpi xmlns:a14="http://schemas.microsoft.com/office/drawing/2010/main" val="0"/>
+                </a:ext>
+              </a:extLst>
+            </a:blip>
+            <a:srcRect/>
+            <a:stretch>
+              <a:fillRect/>
+            </a:stretch>
+          </p:blipFill>
+          <p:spPr bwMode="auto">
+            <a:xfrm>
+              <a:off x="5100638" y="3609310"/>
+              <a:ext cx="1990724" cy="1990724"/>
+            </a:xfrm>
+            <a:prstGeom prst="rect">
+              <a:avLst/>
+            </a:prstGeom>
+            <a:noFill/>
+          </p:spPr>
+        </p:pic>
+      </p:grpSp>
     </p:spTree>
     <p:extLst>
       <p:ext uri="{BB962C8B-B14F-4D97-AF65-F5344CB8AC3E}">
@@ -7864,7 +8494,7 @@
             <a:pPr algn="ctr"/>
             <a:r>
               <a:rPr lang="en-US" sz="4800" b="1" u="sng" dirty="0"/>
-              <a:t>Success Metric(s)</a:t>
+              <a:t>Success Metrics</a:t>
             </a:r>
           </a:p>
         </p:txBody>
@@ -7884,7 +8514,7 @@
         <p:spPr>
           <a:xfrm>
             <a:off x="2560320" y="2844225"/>
-            <a:ext cx="7071360" cy="584775"/>
+            <a:ext cx="7071360" cy="1077218"/>
           </a:xfrm>
           <a:prstGeom prst="rect">
             <a:avLst/>
@@ -7899,7 +8529,7 @@
           <a:p>
             <a:r>
               <a:rPr lang="en-US" sz="3200" dirty="0"/>
-              <a:t>1. identification of non-functional wells</a:t>
+              <a:t>1. “recall”: identification of non-functional wells</a:t>
             </a:r>
           </a:p>
         </p:txBody>
@@ -7934,7 +8564,7 @@
           <a:p>
             <a:r>
               <a:rPr lang="en-US" sz="3200" dirty="0"/>
-              <a:t>2. (overall) accuracy</a:t>
+              <a:t>2. overall accuracy</a:t>
             </a:r>
           </a:p>
         </p:txBody>

</xml_diff>

<commit_message>
first update after presentation
</commit_message>
<xml_diff>
--- a/presentation.pptx
+++ b/presentation.pptx
@@ -11,19 +11,15 @@
     <p:sldId id="278" r:id="rId5"/>
     <p:sldId id="271" r:id="rId6"/>
     <p:sldId id="279" r:id="rId7"/>
-    <p:sldId id="284" r:id="rId8"/>
-    <p:sldId id="280" r:id="rId9"/>
-    <p:sldId id="281" r:id="rId10"/>
-    <p:sldId id="282" r:id="rId11"/>
-    <p:sldId id="283" r:id="rId12"/>
-    <p:sldId id="285" r:id="rId13"/>
-    <p:sldId id="286" r:id="rId14"/>
-    <p:sldId id="287" r:id="rId15"/>
-    <p:sldId id="288" r:id="rId16"/>
-    <p:sldId id="289" r:id="rId17"/>
-    <p:sldId id="290" r:id="rId18"/>
-    <p:sldId id="291" r:id="rId19"/>
-    <p:sldId id="264" r:id="rId20"/>
+    <p:sldId id="282" r:id="rId8"/>
+    <p:sldId id="285" r:id="rId9"/>
+    <p:sldId id="286" r:id="rId10"/>
+    <p:sldId id="287" r:id="rId11"/>
+    <p:sldId id="288" r:id="rId12"/>
+    <p:sldId id="289" r:id="rId13"/>
+    <p:sldId id="290" r:id="rId14"/>
+    <p:sldId id="291" r:id="rId15"/>
+    <p:sldId id="264" r:id="rId16"/>
   </p:sldIdLst>
   <p:sldSz cx="12192000" cy="6858000"/>
   <p:notesSz cx="6858000" cy="9144000"/>
@@ -417,7 +413,7 @@
           <a:p>
             <a:fld id="{08D01F48-E0E3-A044-AA1C-EFE0FABCDF46}" type="datetimeFigureOut">
               <a:rPr lang="en-US" smtClean="0"/>
-              <a:t>7/8/23</a:t>
+              <a:t>7/13/23</a:t>
             </a:fld>
             <a:endParaRPr lang="en-US"/>
           </a:p>
@@ -615,7 +611,7 @@
           <a:p>
             <a:fld id="{08D01F48-E0E3-A044-AA1C-EFE0FABCDF46}" type="datetimeFigureOut">
               <a:rPr lang="en-US" smtClean="0"/>
-              <a:t>7/8/23</a:t>
+              <a:t>7/13/23</a:t>
             </a:fld>
             <a:endParaRPr lang="en-US"/>
           </a:p>
@@ -823,7 +819,7 @@
           <a:p>
             <a:fld id="{08D01F48-E0E3-A044-AA1C-EFE0FABCDF46}" type="datetimeFigureOut">
               <a:rPr lang="en-US" smtClean="0"/>
-              <a:t>7/8/23</a:t>
+              <a:t>7/13/23</a:t>
             </a:fld>
             <a:endParaRPr lang="en-US"/>
           </a:p>
@@ -1021,7 +1017,7 @@
           <a:p>
             <a:fld id="{08D01F48-E0E3-A044-AA1C-EFE0FABCDF46}" type="datetimeFigureOut">
               <a:rPr lang="en-US" smtClean="0"/>
-              <a:t>7/8/23</a:t>
+              <a:t>7/13/23</a:t>
             </a:fld>
             <a:endParaRPr lang="en-US"/>
           </a:p>
@@ -1296,7 +1292,7 @@
           <a:p>
             <a:fld id="{08D01F48-E0E3-A044-AA1C-EFE0FABCDF46}" type="datetimeFigureOut">
               <a:rPr lang="en-US" smtClean="0"/>
-              <a:t>7/8/23</a:t>
+              <a:t>7/13/23</a:t>
             </a:fld>
             <a:endParaRPr lang="en-US"/>
           </a:p>
@@ -1561,7 +1557,7 @@
           <a:p>
             <a:fld id="{08D01F48-E0E3-A044-AA1C-EFE0FABCDF46}" type="datetimeFigureOut">
               <a:rPr lang="en-US" smtClean="0"/>
-              <a:t>7/8/23</a:t>
+              <a:t>7/13/23</a:t>
             </a:fld>
             <a:endParaRPr lang="en-US"/>
           </a:p>
@@ -1973,7 +1969,7 @@
           <a:p>
             <a:fld id="{08D01F48-E0E3-A044-AA1C-EFE0FABCDF46}" type="datetimeFigureOut">
               <a:rPr lang="en-US" smtClean="0"/>
-              <a:t>7/8/23</a:t>
+              <a:t>7/13/23</a:t>
             </a:fld>
             <a:endParaRPr lang="en-US"/>
           </a:p>
@@ -2114,7 +2110,7 @@
           <a:p>
             <a:fld id="{08D01F48-E0E3-A044-AA1C-EFE0FABCDF46}" type="datetimeFigureOut">
               <a:rPr lang="en-US" smtClean="0"/>
-              <a:t>7/8/23</a:t>
+              <a:t>7/13/23</a:t>
             </a:fld>
             <a:endParaRPr lang="en-US"/>
           </a:p>
@@ -2227,7 +2223,7 @@
           <a:p>
             <a:fld id="{08D01F48-E0E3-A044-AA1C-EFE0FABCDF46}" type="datetimeFigureOut">
               <a:rPr lang="en-US" smtClean="0"/>
-              <a:t>7/8/23</a:t>
+              <a:t>7/13/23</a:t>
             </a:fld>
             <a:endParaRPr lang="en-US"/>
           </a:p>
@@ -2538,7 +2534,7 @@
           <a:p>
             <a:fld id="{08D01F48-E0E3-A044-AA1C-EFE0FABCDF46}" type="datetimeFigureOut">
               <a:rPr lang="en-US" smtClean="0"/>
-              <a:t>7/8/23</a:t>
+              <a:t>7/13/23</a:t>
             </a:fld>
             <a:endParaRPr lang="en-US"/>
           </a:p>
@@ -2826,7 +2822,7 @@
           <a:p>
             <a:fld id="{08D01F48-E0E3-A044-AA1C-EFE0FABCDF46}" type="datetimeFigureOut">
               <a:rPr lang="en-US" smtClean="0"/>
-              <a:t>7/8/23</a:t>
+              <a:t>7/13/23</a:t>
             </a:fld>
             <a:endParaRPr lang="en-US"/>
           </a:p>
@@ -3097,7 +3093,7 @@
           <a:p>
             <a:fld id="{08D01F48-E0E3-A044-AA1C-EFE0FABCDF46}" type="datetimeFigureOut">
               <a:rPr lang="en-US" smtClean="0"/>
-              <a:t>7/8/23</a:t>
+              <a:t>7/13/23</a:t>
             </a:fld>
             <a:endParaRPr lang="en-US"/>
           </a:p>
@@ -3809,1316 +3805,6 @@
           <a:chExt cx="0" cy="0"/>
         </a:xfrm>
       </p:grpSpPr>
-      <p:pic>
-        <p:nvPicPr>
-          <p:cNvPr id="3" name="Picture 2" descr="Tanzania Icons - Free SVG &amp; PNG Tanzania Images - Noun Project">
-            <a:extLst>
-              <a:ext uri="{FF2B5EF4-FFF2-40B4-BE49-F238E27FC236}">
-                <a16:creationId xmlns:a16="http://schemas.microsoft.com/office/drawing/2014/main" id="{ADC62753-D622-412E-87CB-65FF8CC32A5A}"/>
-              </a:ext>
-            </a:extLst>
-          </p:cNvPr>
-          <p:cNvPicPr>
-            <a:picLocks noChangeAspect="1" noChangeArrowheads="1"/>
-          </p:cNvPicPr>
-          <p:nvPr/>
-        </p:nvPicPr>
-        <p:blipFill>
-          <a:blip r:embed="rId2">
-            <a:alphaModFix amt="25000"/>
-            <a:extLst>
-              <a:ext uri="{28A0092B-C50C-407E-A947-70E740481C1C}">
-                <a14:useLocalDpi xmlns:a14="http://schemas.microsoft.com/office/drawing/2010/main" val="0"/>
-              </a:ext>
-            </a:extLst>
-          </a:blip>
-          <a:srcRect/>
-          <a:stretch>
-            <a:fillRect/>
-          </a:stretch>
-        </p:blipFill>
-        <p:spPr bwMode="auto">
-          <a:xfrm>
-            <a:off x="3081338" y="629572"/>
-            <a:ext cx="5867400" cy="5867400"/>
-          </a:xfrm>
-          <a:prstGeom prst="rect">
-            <a:avLst/>
-          </a:prstGeom>
-          <a:noFill/>
-        </p:spPr>
-      </p:pic>
-      <p:sp>
-        <p:nvSpPr>
-          <p:cNvPr id="10" name="TextBox 9">
-            <a:extLst>
-              <a:ext uri="{FF2B5EF4-FFF2-40B4-BE49-F238E27FC236}">
-                <a16:creationId xmlns:a16="http://schemas.microsoft.com/office/drawing/2014/main" id="{8A54DC0F-87AA-E09E-5D1E-3EC84F6BC1D5}"/>
-              </a:ext>
-            </a:extLst>
-          </p:cNvPr>
-          <p:cNvSpPr txBox="1"/>
-          <p:nvPr/>
-        </p:nvSpPr>
-        <p:spPr>
-          <a:xfrm>
-            <a:off x="1843144" y="784843"/>
-            <a:ext cx="8505712" cy="1461939"/>
-          </a:xfrm>
-          <a:prstGeom prst="rect">
-            <a:avLst/>
-          </a:prstGeom>
-          <a:noFill/>
-        </p:spPr>
-        <p:txBody>
-          <a:bodyPr wrap="square" rtlCol="0">
-            <a:spAutoFit/>
-          </a:bodyPr>
-          <a:lstStyle/>
-          <a:p>
-            <a:pPr algn="ctr"/>
-            <a:r>
-              <a:rPr lang="en-US" sz="4800" b="1" u="sng" dirty="0"/>
-              <a:t>Data Overview</a:t>
-            </a:r>
-          </a:p>
-          <a:p>
-            <a:pPr algn="ctr"/>
-            <a:endParaRPr lang="en-US" sz="900" b="1" dirty="0"/>
-          </a:p>
-          <a:p>
-            <a:pPr algn="ctr"/>
-            <a:r>
-              <a:rPr lang="en-US" sz="3200" b="1" dirty="0"/>
-              <a:t>failure rate over time</a:t>
-            </a:r>
-          </a:p>
-        </p:txBody>
-      </p:sp>
-      <p:pic>
-        <p:nvPicPr>
-          <p:cNvPr id="4" name="Picture 3">
-            <a:extLst>
-              <a:ext uri="{FF2B5EF4-FFF2-40B4-BE49-F238E27FC236}">
-                <a16:creationId xmlns:a16="http://schemas.microsoft.com/office/drawing/2014/main" id="{B03B6A48-9B5B-5F29-93DD-14FCF9FF3698}"/>
-              </a:ext>
-            </a:extLst>
-          </p:cNvPr>
-          <p:cNvPicPr>
-            <a:picLocks noChangeAspect="1"/>
-          </p:cNvPicPr>
-          <p:nvPr/>
-        </p:nvPicPr>
-        <p:blipFill>
-          <a:blip r:embed="rId3"/>
-          <a:stretch>
-            <a:fillRect/>
-          </a:stretch>
-        </p:blipFill>
-        <p:spPr>
-          <a:xfrm>
-            <a:off x="2455266" y="2311400"/>
-            <a:ext cx="7281468" cy="4165600"/>
-          </a:xfrm>
-          <a:prstGeom prst="rect">
-            <a:avLst/>
-          </a:prstGeom>
-        </p:spPr>
-      </p:pic>
-    </p:spTree>
-    <p:extLst>
-      <p:ext uri="{BB962C8B-B14F-4D97-AF65-F5344CB8AC3E}">
-        <p14:creationId xmlns:p14="http://schemas.microsoft.com/office/powerpoint/2010/main" val="2075686183"/>
-      </p:ext>
-    </p:extLst>
-  </p:cSld>
-  <p:clrMapOvr>
-    <a:masterClrMapping/>
-  </p:clrMapOvr>
-  <p:timing>
-    <p:tnLst>
-      <p:par>
-        <p:cTn id="1" dur="indefinite" restart="never" nodeType="tmRoot">
-          <p:childTnLst>
-            <p:seq concurrent="1" nextAc="seek">
-              <p:cTn id="2" dur="indefinite" nodeType="mainSeq">
-                <p:childTnLst>
-                  <p:par>
-                    <p:cTn id="3" fill="hold">
-                      <p:stCondLst>
-                        <p:cond delay="indefinite"/>
-                        <p:cond evt="onBegin" delay="0">
-                          <p:tn val="2"/>
-                        </p:cond>
-                      </p:stCondLst>
-                      <p:childTnLst>
-                        <p:par>
-                          <p:cTn id="4" fill="hold">
-                            <p:stCondLst>
-                              <p:cond delay="0"/>
-                            </p:stCondLst>
-                            <p:childTnLst>
-                              <p:par>
-                                <p:cTn id="5" presetID="9" presetClass="entr" presetSubtype="0" fill="hold" nodeType="withEffect">
-                                  <p:stCondLst>
-                                    <p:cond delay="0"/>
-                                  </p:stCondLst>
-                                  <p:childTnLst>
-                                    <p:set>
-                                      <p:cBhvr>
-                                        <p:cTn id="6" dur="1" fill="hold">
-                                          <p:stCondLst>
-                                            <p:cond delay="0"/>
-                                          </p:stCondLst>
-                                        </p:cTn>
-                                        <p:tgtEl>
-                                          <p:spTgt spid="4"/>
-                                        </p:tgtEl>
-                                        <p:attrNameLst>
-                                          <p:attrName>style.visibility</p:attrName>
-                                        </p:attrNameLst>
-                                      </p:cBhvr>
-                                      <p:to>
-                                        <p:strVal val="visible"/>
-                                      </p:to>
-                                    </p:set>
-                                    <p:animEffect transition="in" filter="dissolve">
-                                      <p:cBhvr>
-                                        <p:cTn id="7" dur="500"/>
-                                        <p:tgtEl>
-                                          <p:spTgt spid="4"/>
-                                        </p:tgtEl>
-                                      </p:cBhvr>
-                                    </p:animEffect>
-                                  </p:childTnLst>
-                                </p:cTn>
-                              </p:par>
-                            </p:childTnLst>
-                          </p:cTn>
-                        </p:par>
-                      </p:childTnLst>
-                    </p:cTn>
-                  </p:par>
-                </p:childTnLst>
-              </p:cTn>
-              <p:prevCondLst>
-                <p:cond evt="onPrev" delay="0">
-                  <p:tgtEl>
-                    <p:sldTgt/>
-                  </p:tgtEl>
-                </p:cond>
-              </p:prevCondLst>
-              <p:nextCondLst>
-                <p:cond evt="onNext" delay="0">
-                  <p:tgtEl>
-                    <p:sldTgt/>
-                  </p:tgtEl>
-                </p:cond>
-              </p:nextCondLst>
-            </p:seq>
-          </p:childTnLst>
-        </p:cTn>
-      </p:par>
-    </p:tnLst>
-  </p:timing>
-</p:sld>
-</file>
-
-<file path=ppt/slides/slide11.xml><?xml version="1.0" encoding="utf-8"?>
-<p:sld xmlns:a="http://schemas.openxmlformats.org/drawingml/2006/main" xmlns:r="http://schemas.openxmlformats.org/officeDocument/2006/relationships" xmlns:p="http://schemas.openxmlformats.org/presentationml/2006/main">
-  <p:cSld>
-    <p:spTree>
-      <p:nvGrpSpPr>
-        <p:cNvPr id="1" name=""/>
-        <p:cNvGrpSpPr/>
-        <p:nvPr/>
-      </p:nvGrpSpPr>
-      <p:grpSpPr>
-        <a:xfrm>
-          <a:off x="0" y="0"/>
-          <a:ext cx="0" cy="0"/>
-          <a:chOff x="0" y="0"/>
-          <a:chExt cx="0" cy="0"/>
-        </a:xfrm>
-      </p:grpSpPr>
-      <p:pic>
-        <p:nvPicPr>
-          <p:cNvPr id="3" name="Picture 2" descr="Tanzania Icons - Free SVG &amp; PNG Tanzania Images - Noun Project">
-            <a:extLst>
-              <a:ext uri="{FF2B5EF4-FFF2-40B4-BE49-F238E27FC236}">
-                <a16:creationId xmlns:a16="http://schemas.microsoft.com/office/drawing/2014/main" id="{ADC62753-D622-412E-87CB-65FF8CC32A5A}"/>
-              </a:ext>
-            </a:extLst>
-          </p:cNvPr>
-          <p:cNvPicPr>
-            <a:picLocks noChangeAspect="1" noChangeArrowheads="1"/>
-          </p:cNvPicPr>
-          <p:nvPr/>
-        </p:nvPicPr>
-        <p:blipFill>
-          <a:blip r:embed="rId2">
-            <a:alphaModFix amt="25000"/>
-            <a:extLst>
-              <a:ext uri="{28A0092B-C50C-407E-A947-70E740481C1C}">
-                <a14:useLocalDpi xmlns:a14="http://schemas.microsoft.com/office/drawing/2010/main" val="0"/>
-              </a:ext>
-            </a:extLst>
-          </a:blip>
-          <a:srcRect/>
-          <a:stretch>
-            <a:fillRect/>
-          </a:stretch>
-        </p:blipFill>
-        <p:spPr bwMode="auto">
-          <a:xfrm>
-            <a:off x="3081338" y="629572"/>
-            <a:ext cx="5867400" cy="5867400"/>
-          </a:xfrm>
-          <a:prstGeom prst="rect">
-            <a:avLst/>
-          </a:prstGeom>
-          <a:noFill/>
-        </p:spPr>
-      </p:pic>
-      <p:sp>
-        <p:nvSpPr>
-          <p:cNvPr id="10" name="TextBox 9">
-            <a:extLst>
-              <a:ext uri="{FF2B5EF4-FFF2-40B4-BE49-F238E27FC236}">
-                <a16:creationId xmlns:a16="http://schemas.microsoft.com/office/drawing/2014/main" id="{8A54DC0F-87AA-E09E-5D1E-3EC84F6BC1D5}"/>
-              </a:ext>
-            </a:extLst>
-          </p:cNvPr>
-          <p:cNvSpPr txBox="1"/>
-          <p:nvPr/>
-        </p:nvSpPr>
-        <p:spPr>
-          <a:xfrm>
-            <a:off x="1843144" y="784843"/>
-            <a:ext cx="8505712" cy="1461939"/>
-          </a:xfrm>
-          <a:prstGeom prst="rect">
-            <a:avLst/>
-          </a:prstGeom>
-          <a:noFill/>
-        </p:spPr>
-        <p:txBody>
-          <a:bodyPr wrap="square" rtlCol="0">
-            <a:spAutoFit/>
-          </a:bodyPr>
-          <a:lstStyle/>
-          <a:p>
-            <a:pPr algn="ctr"/>
-            <a:r>
-              <a:rPr lang="en-US" sz="4800" b="1" u="sng" dirty="0"/>
-              <a:t>Data Overview</a:t>
-            </a:r>
-          </a:p>
-          <a:p>
-            <a:pPr algn="ctr"/>
-            <a:endParaRPr lang="en-US" sz="900" b="1" dirty="0"/>
-          </a:p>
-          <a:p>
-            <a:pPr algn="ctr"/>
-            <a:r>
-              <a:rPr lang="en-US" sz="3200" b="1" dirty="0"/>
-              <a:t>performance by installer</a:t>
-            </a:r>
-          </a:p>
-        </p:txBody>
-      </p:sp>
-      <p:pic>
-        <p:nvPicPr>
-          <p:cNvPr id="4" name="Picture 3">
-            <a:extLst>
-              <a:ext uri="{FF2B5EF4-FFF2-40B4-BE49-F238E27FC236}">
-                <a16:creationId xmlns:a16="http://schemas.microsoft.com/office/drawing/2014/main" id="{733241F3-67D2-3537-7F72-0F0B9DF08D82}"/>
-              </a:ext>
-            </a:extLst>
-          </p:cNvPr>
-          <p:cNvPicPr>
-            <a:picLocks noChangeAspect="1"/>
-          </p:cNvPicPr>
-          <p:nvPr/>
-        </p:nvPicPr>
-        <p:blipFill>
-          <a:blip r:embed="rId3"/>
-          <a:stretch>
-            <a:fillRect/>
-          </a:stretch>
-        </p:blipFill>
-        <p:spPr>
-          <a:xfrm>
-            <a:off x="604243" y="2456630"/>
-            <a:ext cx="10983514" cy="3290940"/>
-          </a:xfrm>
-          <a:prstGeom prst="rect">
-            <a:avLst/>
-          </a:prstGeom>
-        </p:spPr>
-      </p:pic>
-    </p:spTree>
-    <p:extLst>
-      <p:ext uri="{BB962C8B-B14F-4D97-AF65-F5344CB8AC3E}">
-        <p14:creationId xmlns:p14="http://schemas.microsoft.com/office/powerpoint/2010/main" val="2019610863"/>
-      </p:ext>
-    </p:extLst>
-  </p:cSld>
-  <p:clrMapOvr>
-    <a:masterClrMapping/>
-  </p:clrMapOvr>
-  <p:timing>
-    <p:tnLst>
-      <p:par>
-        <p:cTn id="1" dur="indefinite" restart="never" nodeType="tmRoot">
-          <p:childTnLst>
-            <p:seq concurrent="1" nextAc="seek">
-              <p:cTn id="2" dur="indefinite" nodeType="mainSeq">
-                <p:childTnLst>
-                  <p:par>
-                    <p:cTn id="3" fill="hold">
-                      <p:stCondLst>
-                        <p:cond delay="indefinite"/>
-                        <p:cond evt="onBegin" delay="0">
-                          <p:tn val="2"/>
-                        </p:cond>
-                      </p:stCondLst>
-                      <p:childTnLst>
-                        <p:par>
-                          <p:cTn id="4" fill="hold">
-                            <p:stCondLst>
-                              <p:cond delay="0"/>
-                            </p:stCondLst>
-                            <p:childTnLst>
-                              <p:par>
-                                <p:cTn id="5" presetID="9" presetClass="entr" presetSubtype="0" fill="hold" nodeType="withEffect">
-                                  <p:stCondLst>
-                                    <p:cond delay="0"/>
-                                  </p:stCondLst>
-                                  <p:childTnLst>
-                                    <p:set>
-                                      <p:cBhvr>
-                                        <p:cTn id="6" dur="1" fill="hold">
-                                          <p:stCondLst>
-                                            <p:cond delay="0"/>
-                                          </p:stCondLst>
-                                        </p:cTn>
-                                        <p:tgtEl>
-                                          <p:spTgt spid="4"/>
-                                        </p:tgtEl>
-                                        <p:attrNameLst>
-                                          <p:attrName>style.visibility</p:attrName>
-                                        </p:attrNameLst>
-                                      </p:cBhvr>
-                                      <p:to>
-                                        <p:strVal val="visible"/>
-                                      </p:to>
-                                    </p:set>
-                                    <p:animEffect transition="in" filter="dissolve">
-                                      <p:cBhvr>
-                                        <p:cTn id="7" dur="500"/>
-                                        <p:tgtEl>
-                                          <p:spTgt spid="4"/>
-                                        </p:tgtEl>
-                                      </p:cBhvr>
-                                    </p:animEffect>
-                                  </p:childTnLst>
-                                </p:cTn>
-                              </p:par>
-                            </p:childTnLst>
-                          </p:cTn>
-                        </p:par>
-                      </p:childTnLst>
-                    </p:cTn>
-                  </p:par>
-                </p:childTnLst>
-              </p:cTn>
-              <p:prevCondLst>
-                <p:cond evt="onPrev" delay="0">
-                  <p:tgtEl>
-                    <p:sldTgt/>
-                  </p:tgtEl>
-                </p:cond>
-              </p:prevCondLst>
-              <p:nextCondLst>
-                <p:cond evt="onNext" delay="0">
-                  <p:tgtEl>
-                    <p:sldTgt/>
-                  </p:tgtEl>
-                </p:cond>
-              </p:nextCondLst>
-            </p:seq>
-          </p:childTnLst>
-        </p:cTn>
-      </p:par>
-    </p:tnLst>
-  </p:timing>
-</p:sld>
-</file>
-
-<file path=ppt/slides/slide12.xml><?xml version="1.0" encoding="utf-8"?>
-<p:sld xmlns:a="http://schemas.openxmlformats.org/drawingml/2006/main" xmlns:r="http://schemas.openxmlformats.org/officeDocument/2006/relationships" xmlns:p="http://schemas.openxmlformats.org/presentationml/2006/main">
-  <p:cSld>
-    <p:spTree>
-      <p:nvGrpSpPr>
-        <p:cNvPr id="1" name=""/>
-        <p:cNvGrpSpPr/>
-        <p:nvPr/>
-      </p:nvGrpSpPr>
-      <p:grpSpPr>
-        <a:xfrm>
-          <a:off x="0" y="0"/>
-          <a:ext cx="0" cy="0"/>
-          <a:chOff x="0" y="0"/>
-          <a:chExt cx="0" cy="0"/>
-        </a:xfrm>
-      </p:grpSpPr>
-      <p:pic>
-        <p:nvPicPr>
-          <p:cNvPr id="3" name="Picture 2" descr="Tanzania Icons - Free SVG &amp; PNG Tanzania Images - Noun Project">
-            <a:extLst>
-              <a:ext uri="{FF2B5EF4-FFF2-40B4-BE49-F238E27FC236}">
-                <a16:creationId xmlns:a16="http://schemas.microsoft.com/office/drawing/2014/main" id="{ADC62753-D622-412E-87CB-65FF8CC32A5A}"/>
-              </a:ext>
-            </a:extLst>
-          </p:cNvPr>
-          <p:cNvPicPr>
-            <a:picLocks noChangeAspect="1" noChangeArrowheads="1"/>
-          </p:cNvPicPr>
-          <p:nvPr/>
-        </p:nvPicPr>
-        <p:blipFill>
-          <a:blip r:embed="rId2">
-            <a:alphaModFix amt="25000"/>
-            <a:extLst>
-              <a:ext uri="{28A0092B-C50C-407E-A947-70E740481C1C}">
-                <a14:useLocalDpi xmlns:a14="http://schemas.microsoft.com/office/drawing/2010/main" val="0"/>
-              </a:ext>
-            </a:extLst>
-          </a:blip>
-          <a:srcRect/>
-          <a:stretch>
-            <a:fillRect/>
-          </a:stretch>
-        </p:blipFill>
-        <p:spPr bwMode="auto">
-          <a:xfrm>
-            <a:off x="3081338" y="629572"/>
-            <a:ext cx="5867400" cy="5867400"/>
-          </a:xfrm>
-          <a:prstGeom prst="rect">
-            <a:avLst/>
-          </a:prstGeom>
-          <a:noFill/>
-        </p:spPr>
-      </p:pic>
-      <p:sp>
-        <p:nvSpPr>
-          <p:cNvPr id="10" name="TextBox 9">
-            <a:extLst>
-              <a:ext uri="{FF2B5EF4-FFF2-40B4-BE49-F238E27FC236}">
-                <a16:creationId xmlns:a16="http://schemas.microsoft.com/office/drawing/2014/main" id="{8A54DC0F-87AA-E09E-5D1E-3EC84F6BC1D5}"/>
-              </a:ext>
-            </a:extLst>
-          </p:cNvPr>
-          <p:cNvSpPr txBox="1"/>
-          <p:nvPr/>
-        </p:nvSpPr>
-        <p:spPr>
-          <a:xfrm>
-            <a:off x="1843144" y="784843"/>
-            <a:ext cx="8505712" cy="830997"/>
-          </a:xfrm>
-          <a:prstGeom prst="rect">
-            <a:avLst/>
-          </a:prstGeom>
-          <a:noFill/>
-        </p:spPr>
-        <p:txBody>
-          <a:bodyPr wrap="square" rtlCol="0">
-            <a:spAutoFit/>
-          </a:bodyPr>
-          <a:lstStyle/>
-          <a:p>
-            <a:pPr algn="ctr"/>
-            <a:r>
-              <a:rPr lang="en-US" sz="4800" b="1" u="sng" dirty="0"/>
-              <a:t>Modeling</a:t>
-            </a:r>
-          </a:p>
-        </p:txBody>
-      </p:sp>
-      <p:graphicFrame>
-        <p:nvGraphicFramePr>
-          <p:cNvPr id="2" name="Table 4">
-            <a:extLst>
-              <a:ext uri="{FF2B5EF4-FFF2-40B4-BE49-F238E27FC236}">
-                <a16:creationId xmlns:a16="http://schemas.microsoft.com/office/drawing/2014/main" id="{26BBA723-A31F-A52C-157A-14017F3DB765}"/>
-              </a:ext>
-            </a:extLst>
-          </p:cNvPr>
-          <p:cNvGraphicFramePr>
-            <a:graphicFrameLocks noGrp="1"/>
-          </p:cNvGraphicFramePr>
-          <p:nvPr>
-            <p:extLst>
-              <p:ext uri="{D42A27DB-BD31-4B8C-83A1-F6EECF244321}">
-                <p14:modId xmlns:p14="http://schemas.microsoft.com/office/powerpoint/2010/main" val="2515412629"/>
-              </p:ext>
-            </p:extLst>
-          </p:nvPr>
-        </p:nvGraphicFramePr>
-        <p:xfrm>
-          <a:off x="1951038" y="2351692"/>
-          <a:ext cx="8127999" cy="2316480"/>
-        </p:xfrm>
-        <a:graphic>
-          <a:graphicData uri="http://schemas.openxmlformats.org/drawingml/2006/table">
-            <a:tbl>
-              <a:tblPr firstRow="1" bandRow="1">
-                <a:tableStyleId>{5C22544A-7EE6-4342-B048-85BDC9FD1C3A}</a:tableStyleId>
-              </a:tblPr>
-              <a:tblGrid>
-                <a:gridCol w="2709333">
-                  <a:extLst>
-                    <a:ext uri="{9D8B030D-6E8A-4147-A177-3AD203B41FA5}">
-                      <a16:colId xmlns:a16="http://schemas.microsoft.com/office/drawing/2014/main" val="2630742427"/>
-                    </a:ext>
-                  </a:extLst>
-                </a:gridCol>
-                <a:gridCol w="2709333">
-                  <a:extLst>
-                    <a:ext uri="{9D8B030D-6E8A-4147-A177-3AD203B41FA5}">
-                      <a16:colId xmlns:a16="http://schemas.microsoft.com/office/drawing/2014/main" val="3081281145"/>
-                    </a:ext>
-                  </a:extLst>
-                </a:gridCol>
-                <a:gridCol w="2709333">
-                  <a:extLst>
-                    <a:ext uri="{9D8B030D-6E8A-4147-A177-3AD203B41FA5}">
-                      <a16:colId xmlns:a16="http://schemas.microsoft.com/office/drawing/2014/main" val="3918613951"/>
-                    </a:ext>
-                  </a:extLst>
-                </a:gridCol>
-              </a:tblGrid>
-              <a:tr h="370840">
-                <a:tc>
-                  <a:txBody>
-                    <a:bodyPr/>
-                    <a:lstStyle/>
-                    <a:p>
-                      <a:pPr algn="ctr"/>
-                      <a:r>
-                        <a:rPr lang="en-US" sz="3200" dirty="0"/>
-                        <a:t>model</a:t>
-                      </a:r>
-                    </a:p>
-                  </a:txBody>
-                  <a:tcPr/>
-                </a:tc>
-                <a:tc>
-                  <a:txBody>
-                    <a:bodyPr/>
-                    <a:lstStyle/>
-                    <a:p>
-                      <a:pPr algn="ctr"/>
-                      <a:r>
-                        <a:rPr lang="en-US" sz="3200" dirty="0"/>
-                        <a:t>recall</a:t>
-                      </a:r>
-                    </a:p>
-                  </a:txBody>
-                  <a:tcPr/>
-                </a:tc>
-                <a:tc>
-                  <a:txBody>
-                    <a:bodyPr/>
-                    <a:lstStyle/>
-                    <a:p>
-                      <a:pPr algn="ctr"/>
-                      <a:r>
-                        <a:rPr lang="en-US" sz="3200" dirty="0"/>
-                        <a:t>accuracy</a:t>
-                      </a:r>
-                    </a:p>
-                  </a:txBody>
-                  <a:tcPr/>
-                </a:tc>
-                <a:extLst>
-                  <a:ext uri="{0D108BD9-81ED-4DB2-BD59-A6C34878D82A}">
-                    <a16:rowId xmlns:a16="http://schemas.microsoft.com/office/drawing/2014/main" val="1710483546"/>
-                  </a:ext>
-                </a:extLst>
-              </a:tr>
-              <a:tr h="370840">
-                <a:tc>
-                  <a:txBody>
-                    <a:bodyPr/>
-                    <a:lstStyle/>
-                    <a:p>
-                      <a:pPr algn="ctr"/>
-                      <a:r>
-                        <a:rPr lang="en-US" sz="3200" dirty="0"/>
-                        <a:t>logistic</a:t>
-                      </a:r>
-                    </a:p>
-                  </a:txBody>
-                  <a:tcPr/>
-                </a:tc>
-                <a:tc>
-                  <a:txBody>
-                    <a:bodyPr/>
-                    <a:lstStyle/>
-                    <a:p>
-                      <a:pPr algn="ctr"/>
-                      <a:r>
-                        <a:rPr lang="en-US" sz="3200" dirty="0"/>
-                        <a:t>77%</a:t>
-                      </a:r>
-                    </a:p>
-                  </a:txBody>
-                  <a:tcPr/>
-                </a:tc>
-                <a:tc>
-                  <a:txBody>
-                    <a:bodyPr/>
-                    <a:lstStyle/>
-                    <a:p>
-                      <a:pPr algn="ctr"/>
-                      <a:r>
-                        <a:rPr lang="en-US" sz="3200" dirty="0"/>
-                        <a:t>75%</a:t>
-                      </a:r>
-                    </a:p>
-                  </a:txBody>
-                  <a:tcPr/>
-                </a:tc>
-                <a:extLst>
-                  <a:ext uri="{0D108BD9-81ED-4DB2-BD59-A6C34878D82A}">
-                    <a16:rowId xmlns:a16="http://schemas.microsoft.com/office/drawing/2014/main" val="249801381"/>
-                  </a:ext>
-                </a:extLst>
-              </a:tr>
-              <a:tr h="370840">
-                <a:tc>
-                  <a:txBody>
-                    <a:bodyPr/>
-                    <a:lstStyle/>
-                    <a:p>
-                      <a:pPr algn="ctr"/>
-                      <a:r>
-                        <a:rPr lang="en-US" sz="3200" dirty="0"/>
-                        <a:t>XG boost</a:t>
-                      </a:r>
-                    </a:p>
-                  </a:txBody>
-                  <a:tcPr/>
-                </a:tc>
-                <a:tc>
-                  <a:txBody>
-                    <a:bodyPr/>
-                    <a:lstStyle/>
-                    <a:p>
-                      <a:pPr algn="ctr"/>
-                      <a:r>
-                        <a:rPr lang="en-US" sz="3200" dirty="0"/>
-                        <a:t>78%</a:t>
-                      </a:r>
-                    </a:p>
-                  </a:txBody>
-                  <a:tcPr/>
-                </a:tc>
-                <a:tc>
-                  <a:txBody>
-                    <a:bodyPr/>
-                    <a:lstStyle/>
-                    <a:p>
-                      <a:pPr algn="ctr"/>
-                      <a:r>
-                        <a:rPr lang="en-US" sz="3200" dirty="0"/>
-                        <a:t>78%</a:t>
-                      </a:r>
-                    </a:p>
-                  </a:txBody>
-                  <a:tcPr/>
-                </a:tc>
-                <a:extLst>
-                  <a:ext uri="{0D108BD9-81ED-4DB2-BD59-A6C34878D82A}">
-                    <a16:rowId xmlns:a16="http://schemas.microsoft.com/office/drawing/2014/main" val="1603193568"/>
-                  </a:ext>
-                </a:extLst>
-              </a:tr>
-              <a:tr h="370840">
-                <a:tc>
-                  <a:txBody>
-                    <a:bodyPr/>
-                    <a:lstStyle/>
-                    <a:p>
-                      <a:pPr algn="ctr"/>
-                      <a:r>
-                        <a:rPr lang="en-US" sz="3200" dirty="0"/>
-                        <a:t>random forest</a:t>
-                      </a:r>
-                    </a:p>
-                  </a:txBody>
-                  <a:tcPr/>
-                </a:tc>
-                <a:tc>
-                  <a:txBody>
-                    <a:bodyPr/>
-                    <a:lstStyle/>
-                    <a:p>
-                      <a:pPr algn="ctr"/>
-                      <a:r>
-                        <a:rPr lang="en-US" sz="3200" dirty="0"/>
-                        <a:t>81%</a:t>
-                      </a:r>
-                    </a:p>
-                  </a:txBody>
-                  <a:tcPr/>
-                </a:tc>
-                <a:tc>
-                  <a:txBody>
-                    <a:bodyPr/>
-                    <a:lstStyle/>
-                    <a:p>
-                      <a:pPr algn="ctr"/>
-                      <a:r>
-                        <a:rPr lang="en-US" sz="3200" dirty="0"/>
-                        <a:t>76%</a:t>
-                      </a:r>
-                    </a:p>
-                  </a:txBody>
-                  <a:tcPr/>
-                </a:tc>
-                <a:extLst>
-                  <a:ext uri="{0D108BD9-81ED-4DB2-BD59-A6C34878D82A}">
-                    <a16:rowId xmlns:a16="http://schemas.microsoft.com/office/drawing/2014/main" val="3935752539"/>
-                  </a:ext>
-                </a:extLst>
-              </a:tr>
-            </a:tbl>
-          </a:graphicData>
-        </a:graphic>
-      </p:graphicFrame>
-    </p:spTree>
-    <p:extLst>
-      <p:ext uri="{BB962C8B-B14F-4D97-AF65-F5344CB8AC3E}">
-        <p14:creationId xmlns:p14="http://schemas.microsoft.com/office/powerpoint/2010/main" val="490542394"/>
-      </p:ext>
-    </p:extLst>
-  </p:cSld>
-  <p:clrMapOvr>
-    <a:masterClrMapping/>
-  </p:clrMapOvr>
-  <p:timing>
-    <p:tnLst>
-      <p:par>
-        <p:cTn id="1" dur="indefinite" restart="never" nodeType="tmRoot">
-          <p:childTnLst>
-            <p:seq concurrent="1" nextAc="seek">
-              <p:cTn id="2" dur="indefinite" nodeType="mainSeq">
-                <p:childTnLst>
-                  <p:par>
-                    <p:cTn id="3" fill="hold">
-                      <p:stCondLst>
-                        <p:cond delay="indefinite"/>
-                        <p:cond evt="onBegin" delay="0">
-                          <p:tn val="2"/>
-                        </p:cond>
-                      </p:stCondLst>
-                      <p:childTnLst>
-                        <p:par>
-                          <p:cTn id="4" fill="hold">
-                            <p:stCondLst>
-                              <p:cond delay="0"/>
-                            </p:stCondLst>
-                            <p:childTnLst>
-                              <p:par>
-                                <p:cTn id="5" presetID="9" presetClass="entr" presetSubtype="0" fill="hold" nodeType="withEffect">
-                                  <p:stCondLst>
-                                    <p:cond delay="0"/>
-                                  </p:stCondLst>
-                                  <p:childTnLst>
-                                    <p:set>
-                                      <p:cBhvr>
-                                        <p:cTn id="6" dur="1" fill="hold">
-                                          <p:stCondLst>
-                                            <p:cond delay="0"/>
-                                          </p:stCondLst>
-                                        </p:cTn>
-                                        <p:tgtEl>
-                                          <p:spTgt spid="2"/>
-                                        </p:tgtEl>
-                                        <p:attrNameLst>
-                                          <p:attrName>style.visibility</p:attrName>
-                                        </p:attrNameLst>
-                                      </p:cBhvr>
-                                      <p:to>
-                                        <p:strVal val="visible"/>
-                                      </p:to>
-                                    </p:set>
-                                    <p:animEffect transition="in" filter="dissolve">
-                                      <p:cBhvr>
-                                        <p:cTn id="7" dur="500"/>
-                                        <p:tgtEl>
-                                          <p:spTgt spid="2"/>
-                                        </p:tgtEl>
-                                      </p:cBhvr>
-                                    </p:animEffect>
-                                  </p:childTnLst>
-                                </p:cTn>
-                              </p:par>
-                            </p:childTnLst>
-                          </p:cTn>
-                        </p:par>
-                      </p:childTnLst>
-                    </p:cTn>
-                  </p:par>
-                </p:childTnLst>
-              </p:cTn>
-              <p:prevCondLst>
-                <p:cond evt="onPrev" delay="0">
-                  <p:tgtEl>
-                    <p:sldTgt/>
-                  </p:tgtEl>
-                </p:cond>
-              </p:prevCondLst>
-              <p:nextCondLst>
-                <p:cond evt="onNext" delay="0">
-                  <p:tgtEl>
-                    <p:sldTgt/>
-                  </p:tgtEl>
-                </p:cond>
-              </p:nextCondLst>
-            </p:seq>
-          </p:childTnLst>
-        </p:cTn>
-      </p:par>
-    </p:tnLst>
-  </p:timing>
-</p:sld>
-</file>
-
-<file path=ppt/slides/slide13.xml><?xml version="1.0" encoding="utf-8"?>
-<p:sld xmlns:a="http://schemas.openxmlformats.org/drawingml/2006/main" xmlns:r="http://schemas.openxmlformats.org/officeDocument/2006/relationships" xmlns:p="http://schemas.openxmlformats.org/presentationml/2006/main">
-  <p:cSld>
-    <p:spTree>
-      <p:nvGrpSpPr>
-        <p:cNvPr id="1" name=""/>
-        <p:cNvGrpSpPr/>
-        <p:nvPr/>
-      </p:nvGrpSpPr>
-      <p:grpSpPr>
-        <a:xfrm>
-          <a:off x="0" y="0"/>
-          <a:ext cx="0" cy="0"/>
-          <a:chOff x="0" y="0"/>
-          <a:chExt cx="0" cy="0"/>
-        </a:xfrm>
-      </p:grpSpPr>
-      <p:sp>
-        <p:nvSpPr>
-          <p:cNvPr id="4" name="TextBox 3">
-            <a:extLst>
-              <a:ext uri="{FF2B5EF4-FFF2-40B4-BE49-F238E27FC236}">
-                <a16:creationId xmlns:a16="http://schemas.microsoft.com/office/drawing/2014/main" id="{9696B0BF-5DA7-57AD-D5E0-8D7F6962E536}"/>
-              </a:ext>
-            </a:extLst>
-          </p:cNvPr>
-          <p:cNvSpPr txBox="1"/>
-          <p:nvPr/>
-        </p:nvSpPr>
-        <p:spPr>
-          <a:xfrm>
-            <a:off x="1843144" y="784843"/>
-            <a:ext cx="8505712" cy="1323439"/>
-          </a:xfrm>
-          <a:prstGeom prst="rect">
-            <a:avLst/>
-          </a:prstGeom>
-          <a:noFill/>
-        </p:spPr>
-        <p:txBody>
-          <a:bodyPr wrap="square" rtlCol="0">
-            <a:spAutoFit/>
-          </a:bodyPr>
-          <a:lstStyle/>
-          <a:p>
-            <a:pPr algn="ctr"/>
-            <a:r>
-              <a:rPr lang="en-US" sz="4800" b="1" u="sng" dirty="0"/>
-              <a:t>Results</a:t>
-            </a:r>
-          </a:p>
-          <a:p>
-            <a:pPr algn="ctr"/>
-            <a:r>
-              <a:rPr lang="en-US" sz="3200" b="1" dirty="0"/>
-              <a:t>most predictive features</a:t>
-            </a:r>
-          </a:p>
-        </p:txBody>
-      </p:sp>
-      <p:sp>
-        <p:nvSpPr>
-          <p:cNvPr id="2" name="TextBox 1">
-            <a:extLst>
-              <a:ext uri="{FF2B5EF4-FFF2-40B4-BE49-F238E27FC236}">
-                <a16:creationId xmlns:a16="http://schemas.microsoft.com/office/drawing/2014/main" id="{C5F0D132-A1C2-41E3-2D4E-F5D6D83ABE44}"/>
-              </a:ext>
-            </a:extLst>
-          </p:cNvPr>
-          <p:cNvSpPr txBox="1"/>
-          <p:nvPr/>
-        </p:nvSpPr>
-        <p:spPr>
-          <a:xfrm>
-            <a:off x="2560320" y="2260025"/>
-            <a:ext cx="7071360" cy="584775"/>
-          </a:xfrm>
-          <a:prstGeom prst="rect">
-            <a:avLst/>
-          </a:prstGeom>
-          <a:noFill/>
-        </p:spPr>
-        <p:txBody>
-          <a:bodyPr wrap="square" rtlCol="0">
-            <a:spAutoFit/>
-          </a:bodyPr>
-          <a:lstStyle/>
-          <a:p>
-            <a:r>
-              <a:rPr lang="en-US" sz="3200" dirty="0"/>
-              <a:t>1. water quantity</a:t>
-            </a:r>
-          </a:p>
-        </p:txBody>
-      </p:sp>
-      <p:pic>
-        <p:nvPicPr>
-          <p:cNvPr id="5" name="Picture 2" descr="Tanzania Icons - Free SVG &amp; PNG Tanzania Images - Noun Project">
-            <a:extLst>
-              <a:ext uri="{FF2B5EF4-FFF2-40B4-BE49-F238E27FC236}">
-                <a16:creationId xmlns:a16="http://schemas.microsoft.com/office/drawing/2014/main" id="{9D54A84B-A92D-ADBB-F99A-BF0A3DD1A32E}"/>
-              </a:ext>
-            </a:extLst>
-          </p:cNvPr>
-          <p:cNvPicPr>
-            <a:picLocks noChangeAspect="1" noChangeArrowheads="1"/>
-          </p:cNvPicPr>
-          <p:nvPr/>
-        </p:nvPicPr>
-        <p:blipFill>
-          <a:blip r:embed="rId2">
-            <a:alphaModFix amt="25000"/>
-            <a:extLst>
-              <a:ext uri="{28A0092B-C50C-407E-A947-70E740481C1C}">
-                <a14:useLocalDpi xmlns:a14="http://schemas.microsoft.com/office/drawing/2010/main" val="0"/>
-              </a:ext>
-            </a:extLst>
-          </a:blip>
-          <a:srcRect/>
-          <a:stretch>
-            <a:fillRect/>
-          </a:stretch>
-        </p:blipFill>
-        <p:spPr bwMode="auto">
-          <a:xfrm>
-            <a:off x="3081338" y="629572"/>
-            <a:ext cx="5867400" cy="5867400"/>
-          </a:xfrm>
-          <a:prstGeom prst="rect">
-            <a:avLst/>
-          </a:prstGeom>
-          <a:noFill/>
-        </p:spPr>
-      </p:pic>
-      <p:pic>
-        <p:nvPicPr>
-          <p:cNvPr id="6" name="Picture 5">
-            <a:extLst>
-              <a:ext uri="{FF2B5EF4-FFF2-40B4-BE49-F238E27FC236}">
-                <a16:creationId xmlns:a16="http://schemas.microsoft.com/office/drawing/2014/main" id="{B8B3D3F1-0868-2ADC-6D0A-38751EAABA4B}"/>
-              </a:ext>
-            </a:extLst>
-          </p:cNvPr>
-          <p:cNvPicPr>
-            <a:picLocks noChangeAspect="1"/>
-          </p:cNvPicPr>
-          <p:nvPr/>
-        </p:nvPicPr>
-        <p:blipFill>
-          <a:blip r:embed="rId3"/>
-          <a:stretch>
-            <a:fillRect/>
-          </a:stretch>
-        </p:blipFill>
-        <p:spPr>
-          <a:xfrm>
-            <a:off x="604243" y="3244030"/>
-            <a:ext cx="10983514" cy="3290940"/>
-          </a:xfrm>
-          <a:prstGeom prst="rect">
-            <a:avLst/>
-          </a:prstGeom>
-        </p:spPr>
-      </p:pic>
-      <mc:AlternateContent xmlns:mc="http://schemas.openxmlformats.org/markup-compatibility/2006">
-        <mc:Choice xmlns:p14="http://schemas.microsoft.com/office/powerpoint/2010/main" Requires="p14">
-          <p:contentPart p14:bwMode="auto" r:id="rId4">
-            <p14:nvContentPartPr>
-              <p14:cNvPr id="20" name="Ink 19">
-                <a:extLst>
-                  <a:ext uri="{FF2B5EF4-FFF2-40B4-BE49-F238E27FC236}">
-                    <a16:creationId xmlns:a16="http://schemas.microsoft.com/office/drawing/2014/main" id="{C0DB7BD8-85DE-8AEA-D3C6-92AE18DC9858}"/>
-                  </a:ext>
-                </a:extLst>
-              </p14:cNvPr>
-              <p14:cNvContentPartPr/>
-              <p14:nvPr/>
-            </p14:nvContentPartPr>
-            <p14:xfrm>
-              <a:off x="7007740" y="4657220"/>
-              <a:ext cx="2608560" cy="2362320"/>
-            </p14:xfrm>
-          </p:contentPart>
-        </mc:Choice>
-        <mc:Fallback>
-          <p:pic>
-            <p:nvPicPr>
-              <p:cNvPr id="20" name="Ink 19">
-                <a:extLst>
-                  <a:ext uri="{FF2B5EF4-FFF2-40B4-BE49-F238E27FC236}">
-                    <a16:creationId xmlns:a16="http://schemas.microsoft.com/office/drawing/2014/main" id="{C0DB7BD8-85DE-8AEA-D3C6-92AE18DC9858}"/>
-                  </a:ext>
-                </a:extLst>
-              </p:cNvPr>
-              <p:cNvPicPr/>
-              <p:nvPr/>
-            </p:nvPicPr>
-            <p:blipFill>
-              <a:blip r:embed="rId5"/>
-              <a:stretch>
-                <a:fillRect/>
-              </a:stretch>
-            </p:blipFill>
-            <p:spPr>
-              <a:xfrm>
-                <a:off x="6977140" y="4626620"/>
-                <a:ext cx="2670120" cy="2423520"/>
-              </a:xfrm>
-              <a:prstGeom prst="rect">
-                <a:avLst/>
-              </a:prstGeom>
-            </p:spPr>
-          </p:pic>
-        </mc:Fallback>
-      </mc:AlternateContent>
-    </p:spTree>
-    <p:extLst>
-      <p:ext uri="{BB962C8B-B14F-4D97-AF65-F5344CB8AC3E}">
-        <p14:creationId xmlns:p14="http://schemas.microsoft.com/office/powerpoint/2010/main" val="410000195"/>
-      </p:ext>
-    </p:extLst>
-  </p:cSld>
-  <p:clrMapOvr>
-    <a:masterClrMapping/>
-  </p:clrMapOvr>
-  <p:timing>
-    <p:tnLst>
-      <p:par>
-        <p:cTn id="1" dur="indefinite" restart="never" nodeType="tmRoot">
-          <p:childTnLst>
-            <p:seq concurrent="1" nextAc="seek">
-              <p:cTn id="2" dur="indefinite" nodeType="mainSeq">
-                <p:childTnLst>
-                  <p:par>
-                    <p:cTn id="3" fill="hold">
-                      <p:stCondLst>
-                        <p:cond delay="indefinite"/>
-                      </p:stCondLst>
-                      <p:childTnLst>
-                        <p:par>
-                          <p:cTn id="4" fill="hold">
-                            <p:stCondLst>
-                              <p:cond delay="0"/>
-                            </p:stCondLst>
-                            <p:childTnLst>
-                              <p:par>
-                                <p:cTn id="5" presetID="9" presetClass="entr" presetSubtype="0" fill="hold" grpId="0" nodeType="clickEffect">
-                                  <p:stCondLst>
-                                    <p:cond delay="0"/>
-                                  </p:stCondLst>
-                                  <p:childTnLst>
-                                    <p:set>
-                                      <p:cBhvr>
-                                        <p:cTn id="6" dur="1" fill="hold">
-                                          <p:stCondLst>
-                                            <p:cond delay="0"/>
-                                          </p:stCondLst>
-                                        </p:cTn>
-                                        <p:tgtEl>
-                                          <p:spTgt spid="2"/>
-                                        </p:tgtEl>
-                                        <p:attrNameLst>
-                                          <p:attrName>style.visibility</p:attrName>
-                                        </p:attrNameLst>
-                                      </p:cBhvr>
-                                      <p:to>
-                                        <p:strVal val="visible"/>
-                                      </p:to>
-                                    </p:set>
-                                    <p:animEffect transition="in" filter="dissolve">
-                                      <p:cBhvr>
-                                        <p:cTn id="7" dur="500"/>
-                                        <p:tgtEl>
-                                          <p:spTgt spid="2"/>
-                                        </p:tgtEl>
-                                      </p:cBhvr>
-                                    </p:animEffect>
-                                  </p:childTnLst>
-                                </p:cTn>
-                              </p:par>
-                              <p:par>
-                                <p:cTn id="8" presetID="9" presetClass="entr" presetSubtype="0" fill="hold" nodeType="withEffect">
-                                  <p:stCondLst>
-                                    <p:cond delay="0"/>
-                                  </p:stCondLst>
-                                  <p:childTnLst>
-                                    <p:set>
-                                      <p:cBhvr>
-                                        <p:cTn id="9" dur="1" fill="hold">
-                                          <p:stCondLst>
-                                            <p:cond delay="0"/>
-                                          </p:stCondLst>
-                                        </p:cTn>
-                                        <p:tgtEl>
-                                          <p:spTgt spid="6"/>
-                                        </p:tgtEl>
-                                        <p:attrNameLst>
-                                          <p:attrName>style.visibility</p:attrName>
-                                        </p:attrNameLst>
-                                      </p:cBhvr>
-                                      <p:to>
-                                        <p:strVal val="visible"/>
-                                      </p:to>
-                                    </p:set>
-                                    <p:animEffect transition="in" filter="dissolve">
-                                      <p:cBhvr>
-                                        <p:cTn id="10" dur="500"/>
-                                        <p:tgtEl>
-                                          <p:spTgt spid="6"/>
-                                        </p:tgtEl>
-                                      </p:cBhvr>
-                                    </p:animEffect>
-                                  </p:childTnLst>
-                                </p:cTn>
-                              </p:par>
-                            </p:childTnLst>
-                          </p:cTn>
-                        </p:par>
-                      </p:childTnLst>
-                    </p:cTn>
-                  </p:par>
-                  <p:par>
-                    <p:cTn id="11" fill="hold">
-                      <p:stCondLst>
-                        <p:cond delay="indefinite"/>
-                      </p:stCondLst>
-                      <p:childTnLst>
-                        <p:par>
-                          <p:cTn id="12" fill="hold">
-                            <p:stCondLst>
-                              <p:cond delay="0"/>
-                            </p:stCondLst>
-                            <p:childTnLst>
-                              <p:par>
-                                <p:cTn id="13" presetID="9" presetClass="entr" presetSubtype="0" fill="hold" nodeType="clickEffect">
-                                  <p:stCondLst>
-                                    <p:cond delay="0"/>
-                                  </p:stCondLst>
-                                  <p:childTnLst>
-                                    <p:set>
-                                      <p:cBhvr>
-                                        <p:cTn id="14" dur="1" fill="hold">
-                                          <p:stCondLst>
-                                            <p:cond delay="0"/>
-                                          </p:stCondLst>
-                                        </p:cTn>
-                                        <p:tgtEl>
-                                          <p:spTgt spid="20"/>
-                                        </p:tgtEl>
-                                        <p:attrNameLst>
-                                          <p:attrName>style.visibility</p:attrName>
-                                        </p:attrNameLst>
-                                      </p:cBhvr>
-                                      <p:to>
-                                        <p:strVal val="visible"/>
-                                      </p:to>
-                                    </p:set>
-                                    <p:animEffect transition="in" filter="dissolve">
-                                      <p:cBhvr>
-                                        <p:cTn id="15" dur="1000"/>
-                                        <p:tgtEl>
-                                          <p:spTgt spid="20"/>
-                                        </p:tgtEl>
-                                      </p:cBhvr>
-                                    </p:animEffect>
-                                  </p:childTnLst>
-                                </p:cTn>
-                              </p:par>
-                            </p:childTnLst>
-                          </p:cTn>
-                        </p:par>
-                      </p:childTnLst>
-                    </p:cTn>
-                  </p:par>
-                </p:childTnLst>
-              </p:cTn>
-              <p:prevCondLst>
-                <p:cond evt="onPrev" delay="0">
-                  <p:tgtEl>
-                    <p:sldTgt/>
-                  </p:tgtEl>
-                </p:cond>
-              </p:prevCondLst>
-              <p:nextCondLst>
-                <p:cond evt="onNext" delay="0">
-                  <p:tgtEl>
-                    <p:sldTgt/>
-                  </p:tgtEl>
-                </p:cond>
-              </p:nextCondLst>
-            </p:seq>
-          </p:childTnLst>
-        </p:cTn>
-      </p:par>
-    </p:tnLst>
-    <p:bldLst>
-      <p:bldP spid="2" grpId="0"/>
-    </p:bldLst>
-  </p:timing>
-</p:sld>
-</file>
-
-<file path=ppt/slides/slide14.xml><?xml version="1.0" encoding="utf-8"?>
-<p:sld xmlns:a="http://schemas.openxmlformats.org/drawingml/2006/main" xmlns:r="http://schemas.openxmlformats.org/officeDocument/2006/relationships" xmlns:p="http://schemas.openxmlformats.org/presentationml/2006/main">
-  <p:cSld>
-    <p:spTree>
-      <p:nvGrpSpPr>
-        <p:cNvPr id="1" name=""/>
-        <p:cNvGrpSpPr/>
-        <p:nvPr/>
-      </p:nvGrpSpPr>
-      <p:grpSpPr>
-        <a:xfrm>
-          <a:off x="0" y="0"/>
-          <a:ext cx="0" cy="0"/>
-          <a:chOff x="0" y="0"/>
-          <a:chExt cx="0" cy="0"/>
-        </a:xfrm>
-      </p:grpSpPr>
       <p:sp>
         <p:nvSpPr>
           <p:cNvPr id="4" name="TextBox 3">
@@ -5266,8 +3952,8 @@
           </a:prstGeom>
         </p:spPr>
       </p:pic>
-      <mc:AlternateContent xmlns:mc="http://schemas.openxmlformats.org/markup-compatibility/2006">
-        <mc:Choice xmlns:p14="http://schemas.microsoft.com/office/powerpoint/2010/main" Requires="p14">
+      <mc:AlternateContent xmlns:mc="http://schemas.openxmlformats.org/markup-compatibility/2006" xmlns:p14="http://schemas.microsoft.com/office/powerpoint/2010/main">
+        <mc:Choice Requires="p14">
           <p:contentPart p14:bwMode="auto" r:id="rId4">
             <p14:nvContentPartPr>
               <p14:cNvPr id="8" name="Ink 7">
@@ -5286,7 +3972,7 @@
             </p14:xfrm>
           </p:contentPart>
         </mc:Choice>
-        <mc:Fallback>
+        <mc:Fallback xmlns="">
           <p:pic>
             <p:nvPicPr>
               <p:cNvPr id="8" name="Ink 7">
@@ -5317,8 +4003,8 @@
           </p:pic>
         </mc:Fallback>
       </mc:AlternateContent>
-      <mc:AlternateContent xmlns:mc="http://schemas.openxmlformats.org/markup-compatibility/2006">
-        <mc:Choice xmlns:p14="http://schemas.microsoft.com/office/powerpoint/2010/main" Requires="p14">
+      <mc:AlternateContent xmlns:mc="http://schemas.openxmlformats.org/markup-compatibility/2006" xmlns:p14="http://schemas.microsoft.com/office/powerpoint/2010/main">
+        <mc:Choice Requires="p14">
           <p:contentPart p14:bwMode="auto" r:id="rId6">
             <p14:nvContentPartPr>
               <p14:cNvPr id="12" name="Ink 11">
@@ -5337,7 +4023,7 @@
             </p14:xfrm>
           </p:contentPart>
         </mc:Choice>
-        <mc:Fallback>
+        <mc:Fallback xmlns="">
           <p:pic>
             <p:nvPicPr>
               <p:cNvPr id="12" name="Ink 11">
@@ -5593,7 +4279,7 @@
 </p:sld>
 </file>
 
-<file path=ppt/slides/slide15.xml><?xml version="1.0" encoding="utf-8"?>
+<file path=ppt/slides/slide11.xml><?xml version="1.0" encoding="utf-8"?>
 <p:sld xmlns:a="http://schemas.openxmlformats.org/drawingml/2006/main" xmlns:r="http://schemas.openxmlformats.org/officeDocument/2006/relationships" xmlns:p="http://schemas.openxmlformats.org/presentationml/2006/main">
   <p:cSld>
     <p:spTree>
@@ -5757,8 +4443,8 @@
           </a:prstGeom>
         </p:spPr>
       </p:pic>
-      <mc:AlternateContent xmlns:mc="http://schemas.openxmlformats.org/markup-compatibility/2006">
-        <mc:Choice xmlns:p14="http://schemas.microsoft.com/office/powerpoint/2010/main" Requires="p14">
+      <mc:AlternateContent xmlns:mc="http://schemas.openxmlformats.org/markup-compatibility/2006" xmlns:p14="http://schemas.microsoft.com/office/powerpoint/2010/main">
+        <mc:Choice Requires="p14">
           <p:contentPart p14:bwMode="auto" r:id="rId4">
             <p14:nvContentPartPr>
               <p14:cNvPr id="18" name="Ink 17">
@@ -5777,7 +4463,7 @@
             </p14:xfrm>
           </p:contentPart>
         </mc:Choice>
-        <mc:Fallback>
+        <mc:Fallback xmlns="">
           <p:pic>
             <p:nvPicPr>
               <p:cNvPr id="18" name="Ink 17">
@@ -5808,8 +4494,8 @@
           </p:pic>
         </mc:Fallback>
       </mc:AlternateContent>
-      <mc:AlternateContent xmlns:mc="http://schemas.openxmlformats.org/markup-compatibility/2006">
-        <mc:Choice xmlns:p14="http://schemas.microsoft.com/office/powerpoint/2010/main" Requires="p14">
+      <mc:AlternateContent xmlns:mc="http://schemas.openxmlformats.org/markup-compatibility/2006" xmlns:p14="http://schemas.microsoft.com/office/powerpoint/2010/main">
+        <mc:Choice Requires="p14">
           <p:contentPart p14:bwMode="auto" r:id="rId6">
             <p14:nvContentPartPr>
               <p14:cNvPr id="26" name="Ink 25">
@@ -5828,7 +4514,7 @@
             </p14:xfrm>
           </p:contentPart>
         </mc:Choice>
-        <mc:Fallback>
+        <mc:Fallback xmlns="">
           <p:pic>
             <p:nvPicPr>
               <p:cNvPr id="26" name="Ink 25">
@@ -6084,7 +4770,7 @@
 </p:sld>
 </file>
 
-<file path=ppt/slides/slide16.xml><?xml version="1.0" encoding="utf-8"?>
+<file path=ppt/slides/slide12.xml><?xml version="1.0" encoding="utf-8"?>
 <p:sld xmlns:a="http://schemas.openxmlformats.org/drawingml/2006/main" xmlns:r="http://schemas.openxmlformats.org/officeDocument/2006/relationships" xmlns:p="http://schemas.openxmlformats.org/presentationml/2006/main">
   <p:cSld>
     <p:spTree>
@@ -6585,7 +5271,7 @@
 </p:sld>
 </file>
 
-<file path=ppt/slides/slide17.xml><?xml version="1.0" encoding="utf-8"?>
+<file path=ppt/slides/slide13.xml><?xml version="1.0" encoding="utf-8"?>
 <p:sld xmlns:a="http://schemas.openxmlformats.org/drawingml/2006/main" xmlns:r="http://schemas.openxmlformats.org/officeDocument/2006/relationships" xmlns:p="http://schemas.openxmlformats.org/presentationml/2006/main">
   <p:cSld>
     <p:spTree>
@@ -7183,7 +5869,7 @@
 </p:sld>
 </file>
 
-<file path=ppt/slides/slide18.xml><?xml version="1.0" encoding="utf-8"?>
+<file path=ppt/slides/slide14.xml><?xml version="1.0" encoding="utf-8"?>
 <p:sld xmlns:a="http://schemas.openxmlformats.org/drawingml/2006/main" xmlns:r="http://schemas.openxmlformats.org/officeDocument/2006/relationships" xmlns:p="http://schemas.openxmlformats.org/presentationml/2006/main">
   <p:cSld>
     <p:spTree>
@@ -7498,7 +6184,7 @@
 </p:sld>
 </file>
 
-<file path=ppt/slides/slide19.xml><?xml version="1.0" encoding="utf-8"?>
+<file path=ppt/slides/slide15.xml><?xml version="1.0" encoding="utf-8"?>
 <p:sld xmlns:a="http://schemas.openxmlformats.org/drawingml/2006/main" xmlns:r="http://schemas.openxmlformats.org/officeDocument/2006/relationships" xmlns:p="http://schemas.openxmlformats.org/presentationml/2006/main">
   <p:cSld>
     <p:spTree>
@@ -9596,17 +8282,17 @@
             <a:pPr algn="ctr"/>
             <a:r>
               <a:rPr lang="en-US" sz="3200" b="1" dirty="0"/>
-              <a:t>performance by region</a:t>
+              <a:t>failure rate over time</a:t>
             </a:r>
           </a:p>
         </p:txBody>
       </p:sp>
       <p:pic>
         <p:nvPicPr>
-          <p:cNvPr id="2" name="Picture 1">
-            <a:extLst>
-              <a:ext uri="{FF2B5EF4-FFF2-40B4-BE49-F238E27FC236}">
-                <a16:creationId xmlns:a16="http://schemas.microsoft.com/office/drawing/2014/main" id="{B9BF9978-06CF-D5EB-0262-E6BFD896BA50}"/>
+          <p:cNvPr id="4" name="Picture 3">
+            <a:extLst>
+              <a:ext uri="{FF2B5EF4-FFF2-40B4-BE49-F238E27FC236}">
+                <a16:creationId xmlns:a16="http://schemas.microsoft.com/office/drawing/2014/main" id="{B03B6A48-9B5B-5F29-93DD-14FCF9FF3698}"/>
               </a:ext>
             </a:extLst>
           </p:cNvPr>
@@ -9623,8 +8309,8 @@
         </p:blipFill>
         <p:spPr>
           <a:xfrm>
-            <a:off x="604243" y="2431511"/>
-            <a:ext cx="10983514" cy="3315778"/>
+            <a:off x="2455266" y="2311400"/>
+            <a:ext cx="7281468" cy="4165600"/>
           </a:xfrm>
           <a:prstGeom prst="rect">
             <a:avLst/>
@@ -9634,239 +8320,7 @@
     </p:spTree>
     <p:extLst>
       <p:ext uri="{BB962C8B-B14F-4D97-AF65-F5344CB8AC3E}">
-        <p14:creationId xmlns:p14="http://schemas.microsoft.com/office/powerpoint/2010/main" val="2477464710"/>
-      </p:ext>
-    </p:extLst>
-  </p:cSld>
-  <p:clrMapOvr>
-    <a:masterClrMapping/>
-  </p:clrMapOvr>
-  <p:timing>
-    <p:tnLst>
-      <p:par>
-        <p:cTn id="1" dur="indefinite" restart="never" nodeType="tmRoot">
-          <p:childTnLst>
-            <p:seq concurrent="1" nextAc="seek">
-              <p:cTn id="2" dur="indefinite" nodeType="mainSeq">
-                <p:childTnLst>
-                  <p:par>
-                    <p:cTn id="3" fill="hold">
-                      <p:stCondLst>
-                        <p:cond delay="indefinite"/>
-                        <p:cond evt="onBegin" delay="0">
-                          <p:tn val="2"/>
-                        </p:cond>
-                      </p:stCondLst>
-                      <p:childTnLst>
-                        <p:par>
-                          <p:cTn id="4" fill="hold">
-                            <p:stCondLst>
-                              <p:cond delay="0"/>
-                            </p:stCondLst>
-                            <p:childTnLst>
-                              <p:par>
-                                <p:cTn id="5" presetID="9" presetClass="entr" presetSubtype="0" fill="hold" nodeType="withEffect">
-                                  <p:stCondLst>
-                                    <p:cond delay="0"/>
-                                  </p:stCondLst>
-                                  <p:childTnLst>
-                                    <p:set>
-                                      <p:cBhvr>
-                                        <p:cTn id="6" dur="1" fill="hold">
-                                          <p:stCondLst>
-                                            <p:cond delay="0"/>
-                                          </p:stCondLst>
-                                        </p:cTn>
-                                        <p:tgtEl>
-                                          <p:spTgt spid="2"/>
-                                        </p:tgtEl>
-                                        <p:attrNameLst>
-                                          <p:attrName>style.visibility</p:attrName>
-                                        </p:attrNameLst>
-                                      </p:cBhvr>
-                                      <p:to>
-                                        <p:strVal val="visible"/>
-                                      </p:to>
-                                    </p:set>
-                                    <p:animEffect transition="in" filter="dissolve">
-                                      <p:cBhvr>
-                                        <p:cTn id="7" dur="500"/>
-                                        <p:tgtEl>
-                                          <p:spTgt spid="2"/>
-                                        </p:tgtEl>
-                                      </p:cBhvr>
-                                    </p:animEffect>
-                                  </p:childTnLst>
-                                </p:cTn>
-                              </p:par>
-                            </p:childTnLst>
-                          </p:cTn>
-                        </p:par>
-                      </p:childTnLst>
-                    </p:cTn>
-                  </p:par>
-                </p:childTnLst>
-              </p:cTn>
-              <p:prevCondLst>
-                <p:cond evt="onPrev" delay="0">
-                  <p:tgtEl>
-                    <p:sldTgt/>
-                  </p:tgtEl>
-                </p:cond>
-              </p:prevCondLst>
-              <p:nextCondLst>
-                <p:cond evt="onNext" delay="0">
-                  <p:tgtEl>
-                    <p:sldTgt/>
-                  </p:tgtEl>
-                </p:cond>
-              </p:nextCondLst>
-            </p:seq>
-          </p:childTnLst>
-        </p:cTn>
-      </p:par>
-    </p:tnLst>
-  </p:timing>
-</p:sld>
-</file>
-
-<file path=ppt/slides/slide8.xml><?xml version="1.0" encoding="utf-8"?>
-<p:sld xmlns:a="http://schemas.openxmlformats.org/drawingml/2006/main" xmlns:r="http://schemas.openxmlformats.org/officeDocument/2006/relationships" xmlns:p="http://schemas.openxmlformats.org/presentationml/2006/main">
-  <p:cSld>
-    <p:spTree>
-      <p:nvGrpSpPr>
-        <p:cNvPr id="1" name=""/>
-        <p:cNvGrpSpPr/>
-        <p:nvPr/>
-      </p:nvGrpSpPr>
-      <p:grpSpPr>
-        <a:xfrm>
-          <a:off x="0" y="0"/>
-          <a:ext cx="0" cy="0"/>
-          <a:chOff x="0" y="0"/>
-          <a:chExt cx="0" cy="0"/>
-        </a:xfrm>
-      </p:grpSpPr>
-      <p:pic>
-        <p:nvPicPr>
-          <p:cNvPr id="3" name="Picture 2" descr="Tanzania Icons - Free SVG &amp; PNG Tanzania Images - Noun Project">
-            <a:extLst>
-              <a:ext uri="{FF2B5EF4-FFF2-40B4-BE49-F238E27FC236}">
-                <a16:creationId xmlns:a16="http://schemas.microsoft.com/office/drawing/2014/main" id="{ADC62753-D622-412E-87CB-65FF8CC32A5A}"/>
-              </a:ext>
-            </a:extLst>
-          </p:cNvPr>
-          <p:cNvPicPr>
-            <a:picLocks noChangeAspect="1" noChangeArrowheads="1"/>
-          </p:cNvPicPr>
-          <p:nvPr/>
-        </p:nvPicPr>
-        <p:blipFill>
-          <a:blip r:embed="rId2">
-            <a:alphaModFix amt="25000"/>
-            <a:extLst>
-              <a:ext uri="{28A0092B-C50C-407E-A947-70E740481C1C}">
-                <a14:useLocalDpi xmlns:a14="http://schemas.microsoft.com/office/drawing/2010/main" val="0"/>
-              </a:ext>
-            </a:extLst>
-          </a:blip>
-          <a:srcRect/>
-          <a:stretch>
-            <a:fillRect/>
-          </a:stretch>
-        </p:blipFill>
-        <p:spPr bwMode="auto">
-          <a:xfrm>
-            <a:off x="3081338" y="629572"/>
-            <a:ext cx="5867400" cy="5867400"/>
-          </a:xfrm>
-          <a:prstGeom prst="rect">
-            <a:avLst/>
-          </a:prstGeom>
-          <a:noFill/>
-        </p:spPr>
-      </p:pic>
-      <p:sp>
-        <p:nvSpPr>
-          <p:cNvPr id="10" name="TextBox 9">
-            <a:extLst>
-              <a:ext uri="{FF2B5EF4-FFF2-40B4-BE49-F238E27FC236}">
-                <a16:creationId xmlns:a16="http://schemas.microsoft.com/office/drawing/2014/main" id="{8A54DC0F-87AA-E09E-5D1E-3EC84F6BC1D5}"/>
-              </a:ext>
-            </a:extLst>
-          </p:cNvPr>
-          <p:cNvSpPr txBox="1"/>
-          <p:nvPr/>
-        </p:nvSpPr>
-        <p:spPr>
-          <a:xfrm>
-            <a:off x="1843144" y="784843"/>
-            <a:ext cx="8505712" cy="1461939"/>
-          </a:xfrm>
-          <a:prstGeom prst="rect">
-            <a:avLst/>
-          </a:prstGeom>
-          <a:noFill/>
-        </p:spPr>
-        <p:txBody>
-          <a:bodyPr wrap="square" rtlCol="0">
-            <a:spAutoFit/>
-          </a:bodyPr>
-          <a:lstStyle/>
-          <a:p>
-            <a:pPr algn="ctr"/>
-            <a:r>
-              <a:rPr lang="en-US" sz="4800" b="1" u="sng" dirty="0"/>
-              <a:t>Data Overview</a:t>
-            </a:r>
-          </a:p>
-          <a:p>
-            <a:pPr algn="ctr"/>
-            <a:endParaRPr lang="en-US" sz="900" b="1" dirty="0"/>
-          </a:p>
-          <a:p>
-            <a:pPr algn="ctr"/>
-            <a:r>
-              <a:rPr lang="en-US" sz="3200" b="1" dirty="0"/>
-              <a:t>performance by water quantity</a:t>
-            </a:r>
-          </a:p>
-        </p:txBody>
-      </p:sp>
-      <p:pic>
-        <p:nvPicPr>
-          <p:cNvPr id="4" name="Picture 3">
-            <a:extLst>
-              <a:ext uri="{FF2B5EF4-FFF2-40B4-BE49-F238E27FC236}">
-                <a16:creationId xmlns:a16="http://schemas.microsoft.com/office/drawing/2014/main" id="{03AD2ACE-2290-FE9E-5CAE-32B01FAE67E6}"/>
-              </a:ext>
-            </a:extLst>
-          </p:cNvPr>
-          <p:cNvPicPr>
-            <a:picLocks noChangeAspect="1"/>
-          </p:cNvPicPr>
-          <p:nvPr/>
-        </p:nvPicPr>
-        <p:blipFill>
-          <a:blip r:embed="rId3"/>
-          <a:stretch>
-            <a:fillRect/>
-          </a:stretch>
-        </p:blipFill>
-        <p:spPr>
-          <a:xfrm>
-            <a:off x="604243" y="2456630"/>
-            <a:ext cx="10983514" cy="3290940"/>
-          </a:xfrm>
-          <a:prstGeom prst="rect">
-            <a:avLst/>
-          </a:prstGeom>
-        </p:spPr>
-      </p:pic>
-    </p:spTree>
-    <p:extLst>
-      <p:ext uri="{BB962C8B-B14F-4D97-AF65-F5344CB8AC3E}">
-        <p14:creationId xmlns:p14="http://schemas.microsoft.com/office/powerpoint/2010/main" val="3189422568"/>
+        <p14:creationId xmlns:p14="http://schemas.microsoft.com/office/powerpoint/2010/main" val="2075686183"/>
       </p:ext>
     </p:extLst>
   </p:cSld>
@@ -9962,7 +8416,7 @@
 </p:sld>
 </file>
 
-<file path=ppt/slides/slide9.xml><?xml version="1.0" encoding="utf-8"?>
+<file path=ppt/slides/slide8.xml><?xml version="1.0" encoding="utf-8"?>
 <p:sld xmlns:a="http://schemas.openxmlformats.org/drawingml/2006/main" xmlns:r="http://schemas.openxmlformats.org/officeDocument/2006/relationships" xmlns:p="http://schemas.openxmlformats.org/presentationml/2006/main">
   <p:cSld>
     <p:spTree>
@@ -10033,7 +8487,7 @@
         <p:spPr>
           <a:xfrm>
             <a:off x="1843144" y="784843"/>
-            <a:ext cx="8505712" cy="1461939"/>
+            <a:ext cx="8505712" cy="830997"/>
           </a:xfrm>
           <a:prstGeom prst="rect">
             <a:avLst/>
@@ -10049,56 +8503,320 @@
             <a:pPr algn="ctr"/>
             <a:r>
               <a:rPr lang="en-US" sz="4800" b="1" u="sng" dirty="0"/>
-              <a:t>Data Overview</a:t>
-            </a:r>
-          </a:p>
-          <a:p>
-            <a:pPr algn="ctr"/>
-            <a:endParaRPr lang="en-US" sz="900" b="1" dirty="0"/>
-          </a:p>
-          <a:p>
-            <a:pPr algn="ctr"/>
-            <a:r>
-              <a:rPr lang="en-US" sz="3200" b="1" dirty="0"/>
-              <a:t>performance by well structure</a:t>
-            </a:r>
-          </a:p>
-        </p:txBody>
-      </p:sp>
-      <p:pic>
-        <p:nvPicPr>
-          <p:cNvPr id="2" name="Picture 1">
-            <a:extLst>
-              <a:ext uri="{FF2B5EF4-FFF2-40B4-BE49-F238E27FC236}">
-                <a16:creationId xmlns:a16="http://schemas.microsoft.com/office/drawing/2014/main" id="{7F911EDE-8C4E-B410-550E-13B52199A7D5}"/>
-              </a:ext>
-            </a:extLst>
-          </p:cNvPr>
-          <p:cNvPicPr>
-            <a:picLocks noChangeAspect="1"/>
-          </p:cNvPicPr>
+              <a:t>Modeling</a:t>
+            </a:r>
+          </a:p>
+        </p:txBody>
+      </p:sp>
+      <p:graphicFrame>
+        <p:nvGraphicFramePr>
+          <p:cNvPr id="2" name="Table 4">
+            <a:extLst>
+              <a:ext uri="{FF2B5EF4-FFF2-40B4-BE49-F238E27FC236}">
+                <a16:creationId xmlns:a16="http://schemas.microsoft.com/office/drawing/2014/main" id="{26BBA723-A31F-A52C-157A-14017F3DB765}"/>
+              </a:ext>
+            </a:extLst>
+          </p:cNvPr>
+          <p:cNvGraphicFramePr>
+            <a:graphicFrameLocks noGrp="1"/>
+          </p:cNvGraphicFramePr>
+          <p:nvPr>
+            <p:extLst>
+              <p:ext uri="{D42A27DB-BD31-4B8C-83A1-F6EECF244321}">
+                <p14:modId xmlns:p14="http://schemas.microsoft.com/office/powerpoint/2010/main" val="1824173355"/>
+              </p:ext>
+            </p:extLst>
+          </p:nvPr>
+        </p:nvGraphicFramePr>
+        <p:xfrm>
+          <a:off x="1951038" y="1916799"/>
+          <a:ext cx="8127999" cy="2316480"/>
+        </p:xfrm>
+        <a:graphic>
+          <a:graphicData uri="http://schemas.openxmlformats.org/drawingml/2006/table">
+            <a:tbl>
+              <a:tblPr firstRow="1" bandRow="1">
+                <a:tableStyleId>{5C22544A-7EE6-4342-B048-85BDC9FD1C3A}</a:tableStyleId>
+              </a:tblPr>
+              <a:tblGrid>
+                <a:gridCol w="2709333">
+                  <a:extLst>
+                    <a:ext uri="{9D8B030D-6E8A-4147-A177-3AD203B41FA5}">
+                      <a16:colId xmlns:a16="http://schemas.microsoft.com/office/drawing/2014/main" val="2630742427"/>
+                    </a:ext>
+                  </a:extLst>
+                </a:gridCol>
+                <a:gridCol w="2709333">
+                  <a:extLst>
+                    <a:ext uri="{9D8B030D-6E8A-4147-A177-3AD203B41FA5}">
+                      <a16:colId xmlns:a16="http://schemas.microsoft.com/office/drawing/2014/main" val="3081281145"/>
+                    </a:ext>
+                  </a:extLst>
+                </a:gridCol>
+                <a:gridCol w="2709333">
+                  <a:extLst>
+                    <a:ext uri="{9D8B030D-6E8A-4147-A177-3AD203B41FA5}">
+                      <a16:colId xmlns:a16="http://schemas.microsoft.com/office/drawing/2014/main" val="3918613951"/>
+                    </a:ext>
+                  </a:extLst>
+                </a:gridCol>
+              </a:tblGrid>
+              <a:tr h="370840">
+                <a:tc>
+                  <a:txBody>
+                    <a:bodyPr/>
+                    <a:lstStyle/>
+                    <a:p>
+                      <a:pPr algn="ctr"/>
+                      <a:r>
+                        <a:rPr lang="en-US" sz="3200" dirty="0"/>
+                        <a:t>model</a:t>
+                      </a:r>
+                    </a:p>
+                  </a:txBody>
+                  <a:tcPr/>
+                </a:tc>
+                <a:tc>
+                  <a:txBody>
+                    <a:bodyPr/>
+                    <a:lstStyle/>
+                    <a:p>
+                      <a:pPr algn="ctr"/>
+                      <a:r>
+                        <a:rPr lang="en-US" sz="3200" dirty="0"/>
+                        <a:t>recall</a:t>
+                      </a:r>
+                    </a:p>
+                  </a:txBody>
+                  <a:tcPr/>
+                </a:tc>
+                <a:tc>
+                  <a:txBody>
+                    <a:bodyPr/>
+                    <a:lstStyle/>
+                    <a:p>
+                      <a:pPr algn="ctr"/>
+                      <a:r>
+                        <a:rPr lang="en-US" sz="3200" dirty="0"/>
+                        <a:t>accuracy</a:t>
+                      </a:r>
+                    </a:p>
+                  </a:txBody>
+                  <a:tcPr/>
+                </a:tc>
+                <a:extLst>
+                  <a:ext uri="{0D108BD9-81ED-4DB2-BD59-A6C34878D82A}">
+                    <a16:rowId xmlns:a16="http://schemas.microsoft.com/office/drawing/2014/main" val="1710483546"/>
+                  </a:ext>
+                </a:extLst>
+              </a:tr>
+              <a:tr h="370840">
+                <a:tc>
+                  <a:txBody>
+                    <a:bodyPr/>
+                    <a:lstStyle/>
+                    <a:p>
+                      <a:pPr algn="ctr"/>
+                      <a:r>
+                        <a:rPr lang="en-US" sz="3200" dirty="0"/>
+                        <a:t>logistic</a:t>
+                      </a:r>
+                    </a:p>
+                  </a:txBody>
+                  <a:tcPr/>
+                </a:tc>
+                <a:tc>
+                  <a:txBody>
+                    <a:bodyPr/>
+                    <a:lstStyle/>
+                    <a:p>
+                      <a:pPr algn="ctr"/>
+                      <a:r>
+                        <a:rPr lang="en-US" sz="3200" dirty="0"/>
+                        <a:t>77%</a:t>
+                      </a:r>
+                    </a:p>
+                  </a:txBody>
+                  <a:tcPr/>
+                </a:tc>
+                <a:tc>
+                  <a:txBody>
+                    <a:bodyPr/>
+                    <a:lstStyle/>
+                    <a:p>
+                      <a:pPr algn="ctr"/>
+                      <a:r>
+                        <a:rPr lang="en-US" sz="3200" dirty="0"/>
+                        <a:t>75%</a:t>
+                      </a:r>
+                    </a:p>
+                  </a:txBody>
+                  <a:tcPr/>
+                </a:tc>
+                <a:extLst>
+                  <a:ext uri="{0D108BD9-81ED-4DB2-BD59-A6C34878D82A}">
+                    <a16:rowId xmlns:a16="http://schemas.microsoft.com/office/drawing/2014/main" val="249801381"/>
+                  </a:ext>
+                </a:extLst>
+              </a:tr>
+              <a:tr h="370840">
+                <a:tc>
+                  <a:txBody>
+                    <a:bodyPr/>
+                    <a:lstStyle/>
+                    <a:p>
+                      <a:pPr algn="ctr"/>
+                      <a:r>
+                        <a:rPr lang="en-US" sz="3200" dirty="0"/>
+                        <a:t>XG boost</a:t>
+                      </a:r>
+                    </a:p>
+                  </a:txBody>
+                  <a:tcPr/>
+                </a:tc>
+                <a:tc>
+                  <a:txBody>
+                    <a:bodyPr/>
+                    <a:lstStyle/>
+                    <a:p>
+                      <a:pPr algn="ctr"/>
+                      <a:r>
+                        <a:rPr lang="en-US" sz="3200" dirty="0"/>
+                        <a:t>78%</a:t>
+                      </a:r>
+                    </a:p>
+                  </a:txBody>
+                  <a:tcPr/>
+                </a:tc>
+                <a:tc>
+                  <a:txBody>
+                    <a:bodyPr/>
+                    <a:lstStyle/>
+                    <a:p>
+                      <a:pPr algn="ctr"/>
+                      <a:r>
+                        <a:rPr lang="en-US" sz="3200" dirty="0"/>
+                        <a:t>78%</a:t>
+                      </a:r>
+                    </a:p>
+                  </a:txBody>
+                  <a:tcPr/>
+                </a:tc>
+                <a:extLst>
+                  <a:ext uri="{0D108BD9-81ED-4DB2-BD59-A6C34878D82A}">
+                    <a16:rowId xmlns:a16="http://schemas.microsoft.com/office/drawing/2014/main" val="1603193568"/>
+                  </a:ext>
+                </a:extLst>
+              </a:tr>
+              <a:tr h="370840">
+                <a:tc>
+                  <a:txBody>
+                    <a:bodyPr/>
+                    <a:lstStyle/>
+                    <a:p>
+                      <a:pPr algn="ctr"/>
+                      <a:r>
+                        <a:rPr lang="en-US" sz="3200" dirty="0"/>
+                        <a:t>random forest</a:t>
+                      </a:r>
+                    </a:p>
+                  </a:txBody>
+                  <a:tcPr/>
+                </a:tc>
+                <a:tc>
+                  <a:txBody>
+                    <a:bodyPr/>
+                    <a:lstStyle/>
+                    <a:p>
+                      <a:pPr algn="ctr"/>
+                      <a:r>
+                        <a:rPr lang="en-US" sz="3200" dirty="0"/>
+                        <a:t>81%</a:t>
+                      </a:r>
+                    </a:p>
+                  </a:txBody>
+                  <a:tcPr/>
+                </a:tc>
+                <a:tc>
+                  <a:txBody>
+                    <a:bodyPr/>
+                    <a:lstStyle/>
+                    <a:p>
+                      <a:pPr algn="ctr"/>
+                      <a:r>
+                        <a:rPr lang="en-US" sz="3200" dirty="0"/>
+                        <a:t>76%</a:t>
+                      </a:r>
+                    </a:p>
+                  </a:txBody>
+                  <a:tcPr/>
+                </a:tc>
+                <a:extLst>
+                  <a:ext uri="{0D108BD9-81ED-4DB2-BD59-A6C34878D82A}">
+                    <a16:rowId xmlns:a16="http://schemas.microsoft.com/office/drawing/2014/main" val="3935752539"/>
+                  </a:ext>
+                </a:extLst>
+              </a:tr>
+            </a:tbl>
+          </a:graphicData>
+        </a:graphic>
+      </p:graphicFrame>
+      <p:sp>
+        <p:nvSpPr>
+          <p:cNvPr id="4" name="TextBox 3">
+            <a:extLst>
+              <a:ext uri="{FF2B5EF4-FFF2-40B4-BE49-F238E27FC236}">
+                <a16:creationId xmlns:a16="http://schemas.microsoft.com/office/drawing/2014/main" id="{0BB1FBCA-3829-1212-A37B-D147284873CE}"/>
+              </a:ext>
+            </a:extLst>
+          </p:cNvPr>
+          <p:cNvSpPr txBox="1"/>
           <p:nvPr/>
-        </p:nvPicPr>
-        <p:blipFill>
-          <a:blip r:embed="rId3"/>
-          <a:stretch>
-            <a:fillRect/>
-          </a:stretch>
-        </p:blipFill>
+        </p:nvSpPr>
         <p:spPr>
           <a:xfrm>
-            <a:off x="604243" y="2469330"/>
-            <a:ext cx="10983514" cy="3290940"/>
+            <a:off x="1897380" y="4480560"/>
+            <a:ext cx="8397240" cy="2062103"/>
           </a:xfrm>
           <a:prstGeom prst="rect">
             <a:avLst/>
           </a:prstGeom>
+          <a:noFill/>
         </p:spPr>
-      </p:pic>
+        <p:txBody>
+          <a:bodyPr wrap="square" rtlCol="0">
+            <a:spAutoFit/>
+          </a:bodyPr>
+          <a:lstStyle/>
+          <a:p>
+            <a:pPr algn="ctr"/>
+            <a:r>
+              <a:rPr lang="en-US" sz="3200" u="sng" dirty="0"/>
+              <a:t>random forest model statistics:</a:t>
+            </a:r>
+          </a:p>
+          <a:p>
+            <a:pPr algn="ctr"/>
+            <a:endParaRPr lang="en-US" sz="3200" u="sng" dirty="0"/>
+          </a:p>
+          <a:p>
+            <a:r>
+              <a:rPr lang="en-US" sz="3200" dirty="0"/>
+              <a:t>train recall: 83.0%		train accuracy: 80.2%</a:t>
+            </a:r>
+          </a:p>
+          <a:p>
+            <a:r>
+              <a:rPr lang="en-US" sz="3200" dirty="0"/>
+              <a:t>test recall: 80.9%			test accuracy: 76.3%</a:t>
+            </a:r>
+          </a:p>
+        </p:txBody>
+      </p:sp>
     </p:spTree>
     <p:extLst>
       <p:ext uri="{BB962C8B-B14F-4D97-AF65-F5344CB8AC3E}">
-        <p14:creationId xmlns:p14="http://schemas.microsoft.com/office/powerpoint/2010/main" val="3668876523"/>
+        <p14:creationId xmlns:p14="http://schemas.microsoft.com/office/powerpoint/2010/main" val="490542394"/>
       </p:ext>
     </p:extLst>
   </p:cSld>
@@ -10169,6 +8887,59 @@
                       </p:childTnLst>
                     </p:cTn>
                   </p:par>
+                  <p:par>
+                    <p:cTn id="8" fill="hold">
+                      <p:stCondLst>
+                        <p:cond delay="indefinite"/>
+                      </p:stCondLst>
+                      <p:childTnLst>
+                        <p:par>
+                          <p:cTn id="9" fill="hold">
+                            <p:stCondLst>
+                              <p:cond delay="0"/>
+                            </p:stCondLst>
+                            <p:childTnLst>
+                              <p:par>
+                                <p:cTn id="10" presetID="9" presetClass="entr" presetSubtype="0" fill="hold" grpId="0" nodeType="clickEffect">
+                                  <p:stCondLst>
+                                    <p:cond delay="0"/>
+                                  </p:stCondLst>
+                                  <p:childTnLst>
+                                    <p:set>
+                                      <p:cBhvr>
+                                        <p:cTn id="11" dur="1" fill="hold">
+                                          <p:stCondLst>
+                                            <p:cond delay="0"/>
+                                          </p:stCondLst>
+                                        </p:cTn>
+                                        <p:tgtEl>
+                                          <p:spTgt spid="4"/>
+                                        </p:tgtEl>
+                                        <p:attrNameLst>
+                                          <p:attrName>style.visibility</p:attrName>
+                                        </p:attrNameLst>
+                                      </p:cBhvr>
+                                      <p:to>
+                                        <p:strVal val="visible"/>
+                                      </p:to>
+                                    </p:set>
+                                    <p:animEffect transition="in" filter="dissolve">
+                                      <p:cBhvr>
+                                        <p:cTn id="12" dur="500"/>
+                                        <p:tgtEl>
+                                          <p:spTgt spid="4"/>
+                                        </p:tgtEl>
+                                      </p:cBhvr>
+                                    </p:animEffect>
+                                  </p:childTnLst>
+                                </p:cTn>
+                              </p:par>
+                            </p:childTnLst>
+                          </p:cTn>
+                        </p:par>
+                      </p:childTnLst>
+                    </p:cTn>
+                  </p:par>
                 </p:childTnLst>
               </p:cTn>
               <p:prevCondLst>
@@ -10190,6 +8961,411 @@
         </p:cTn>
       </p:par>
     </p:tnLst>
+    <p:bldLst>
+      <p:bldP spid="4" grpId="0"/>
+    </p:bldLst>
+  </p:timing>
+</p:sld>
+</file>
+
+<file path=ppt/slides/slide9.xml><?xml version="1.0" encoding="utf-8"?>
+<p:sld xmlns:a="http://schemas.openxmlformats.org/drawingml/2006/main" xmlns:r="http://schemas.openxmlformats.org/officeDocument/2006/relationships" xmlns:p="http://schemas.openxmlformats.org/presentationml/2006/main">
+  <p:cSld>
+    <p:spTree>
+      <p:nvGrpSpPr>
+        <p:cNvPr id="1" name=""/>
+        <p:cNvGrpSpPr/>
+        <p:nvPr/>
+      </p:nvGrpSpPr>
+      <p:grpSpPr>
+        <a:xfrm>
+          <a:off x="0" y="0"/>
+          <a:ext cx="0" cy="0"/>
+          <a:chOff x="0" y="0"/>
+          <a:chExt cx="0" cy="0"/>
+        </a:xfrm>
+      </p:grpSpPr>
+      <p:sp>
+        <p:nvSpPr>
+          <p:cNvPr id="4" name="TextBox 3">
+            <a:extLst>
+              <a:ext uri="{FF2B5EF4-FFF2-40B4-BE49-F238E27FC236}">
+                <a16:creationId xmlns:a16="http://schemas.microsoft.com/office/drawing/2014/main" id="{9696B0BF-5DA7-57AD-D5E0-8D7F6962E536}"/>
+              </a:ext>
+            </a:extLst>
+          </p:cNvPr>
+          <p:cNvSpPr txBox="1"/>
+          <p:nvPr/>
+        </p:nvSpPr>
+        <p:spPr>
+          <a:xfrm>
+            <a:off x="1843144" y="784843"/>
+            <a:ext cx="8505712" cy="1323439"/>
+          </a:xfrm>
+          <a:prstGeom prst="rect">
+            <a:avLst/>
+          </a:prstGeom>
+          <a:noFill/>
+        </p:spPr>
+        <p:txBody>
+          <a:bodyPr wrap="square" rtlCol="0">
+            <a:spAutoFit/>
+          </a:bodyPr>
+          <a:lstStyle/>
+          <a:p>
+            <a:pPr algn="ctr"/>
+            <a:r>
+              <a:rPr lang="en-US" sz="4800" b="1" u="sng" dirty="0"/>
+              <a:t>Results</a:t>
+            </a:r>
+          </a:p>
+          <a:p>
+            <a:pPr algn="ctr"/>
+            <a:r>
+              <a:rPr lang="en-US" sz="3200" b="1" dirty="0"/>
+              <a:t>most predictive features</a:t>
+            </a:r>
+          </a:p>
+        </p:txBody>
+      </p:sp>
+      <p:sp>
+        <p:nvSpPr>
+          <p:cNvPr id="2" name="TextBox 1">
+            <a:extLst>
+              <a:ext uri="{FF2B5EF4-FFF2-40B4-BE49-F238E27FC236}">
+                <a16:creationId xmlns:a16="http://schemas.microsoft.com/office/drawing/2014/main" id="{C5F0D132-A1C2-41E3-2D4E-F5D6D83ABE44}"/>
+              </a:ext>
+            </a:extLst>
+          </p:cNvPr>
+          <p:cNvSpPr txBox="1"/>
+          <p:nvPr/>
+        </p:nvSpPr>
+        <p:spPr>
+          <a:xfrm>
+            <a:off x="2560320" y="2260025"/>
+            <a:ext cx="7071360" cy="584775"/>
+          </a:xfrm>
+          <a:prstGeom prst="rect">
+            <a:avLst/>
+          </a:prstGeom>
+          <a:noFill/>
+        </p:spPr>
+        <p:txBody>
+          <a:bodyPr wrap="square" rtlCol="0">
+            <a:spAutoFit/>
+          </a:bodyPr>
+          <a:lstStyle/>
+          <a:p>
+            <a:r>
+              <a:rPr lang="en-US" sz="3200" dirty="0"/>
+              <a:t>1. water quantity</a:t>
+            </a:r>
+          </a:p>
+        </p:txBody>
+      </p:sp>
+      <p:pic>
+        <p:nvPicPr>
+          <p:cNvPr id="5" name="Picture 2" descr="Tanzania Icons - Free SVG &amp; PNG Tanzania Images - Noun Project">
+            <a:extLst>
+              <a:ext uri="{FF2B5EF4-FFF2-40B4-BE49-F238E27FC236}">
+                <a16:creationId xmlns:a16="http://schemas.microsoft.com/office/drawing/2014/main" id="{9D54A84B-A92D-ADBB-F99A-BF0A3DD1A32E}"/>
+              </a:ext>
+            </a:extLst>
+          </p:cNvPr>
+          <p:cNvPicPr>
+            <a:picLocks noChangeAspect="1" noChangeArrowheads="1"/>
+          </p:cNvPicPr>
+          <p:nvPr/>
+        </p:nvPicPr>
+        <p:blipFill>
+          <a:blip r:embed="rId2">
+            <a:alphaModFix amt="25000"/>
+            <a:extLst>
+              <a:ext uri="{28A0092B-C50C-407E-A947-70E740481C1C}">
+                <a14:useLocalDpi xmlns:a14="http://schemas.microsoft.com/office/drawing/2010/main" val="0"/>
+              </a:ext>
+            </a:extLst>
+          </a:blip>
+          <a:srcRect/>
+          <a:stretch>
+            <a:fillRect/>
+          </a:stretch>
+        </p:blipFill>
+        <p:spPr bwMode="auto">
+          <a:xfrm>
+            <a:off x="3081338" y="629572"/>
+            <a:ext cx="5867400" cy="5867400"/>
+          </a:xfrm>
+          <a:prstGeom prst="rect">
+            <a:avLst/>
+          </a:prstGeom>
+          <a:noFill/>
+        </p:spPr>
+      </p:pic>
+      <p:pic>
+        <p:nvPicPr>
+          <p:cNvPr id="6" name="Picture 5">
+            <a:extLst>
+              <a:ext uri="{FF2B5EF4-FFF2-40B4-BE49-F238E27FC236}">
+                <a16:creationId xmlns:a16="http://schemas.microsoft.com/office/drawing/2014/main" id="{B8B3D3F1-0868-2ADC-6D0A-38751EAABA4B}"/>
+              </a:ext>
+            </a:extLst>
+          </p:cNvPr>
+          <p:cNvPicPr>
+            <a:picLocks noChangeAspect="1"/>
+          </p:cNvPicPr>
+          <p:nvPr/>
+        </p:nvPicPr>
+        <p:blipFill>
+          <a:blip r:embed="rId3"/>
+          <a:stretch>
+            <a:fillRect/>
+          </a:stretch>
+        </p:blipFill>
+        <p:spPr>
+          <a:xfrm>
+            <a:off x="604243" y="3244030"/>
+            <a:ext cx="10983514" cy="3290940"/>
+          </a:xfrm>
+          <a:prstGeom prst="rect">
+            <a:avLst/>
+          </a:prstGeom>
+        </p:spPr>
+      </p:pic>
+      <mc:AlternateContent xmlns:mc="http://schemas.openxmlformats.org/markup-compatibility/2006" xmlns:p14="http://schemas.microsoft.com/office/powerpoint/2010/main">
+        <mc:Choice Requires="p14">
+          <p:contentPart p14:bwMode="auto" r:id="rId4">
+            <p14:nvContentPartPr>
+              <p14:cNvPr id="20" name="Ink 19">
+                <a:extLst>
+                  <a:ext uri="{FF2B5EF4-FFF2-40B4-BE49-F238E27FC236}">
+                    <a16:creationId xmlns:a16="http://schemas.microsoft.com/office/drawing/2014/main" id="{C0DB7BD8-85DE-8AEA-D3C6-92AE18DC9858}"/>
+                  </a:ext>
+                </a:extLst>
+              </p14:cNvPr>
+              <p14:cNvContentPartPr/>
+              <p14:nvPr/>
+            </p14:nvContentPartPr>
+            <p14:xfrm>
+              <a:off x="7007740" y="4657220"/>
+              <a:ext cx="2608560" cy="2362320"/>
+            </p14:xfrm>
+          </p:contentPart>
+        </mc:Choice>
+        <mc:Fallback xmlns="">
+          <p:pic>
+            <p:nvPicPr>
+              <p:cNvPr id="20" name="Ink 19">
+                <a:extLst>
+                  <a:ext uri="{FF2B5EF4-FFF2-40B4-BE49-F238E27FC236}">
+                    <a16:creationId xmlns:a16="http://schemas.microsoft.com/office/drawing/2014/main" id="{C0DB7BD8-85DE-8AEA-D3C6-92AE18DC9858}"/>
+                  </a:ext>
+                </a:extLst>
+              </p:cNvPr>
+              <p:cNvPicPr/>
+              <p:nvPr/>
+            </p:nvPicPr>
+            <p:blipFill>
+              <a:blip r:embed="rId5"/>
+              <a:stretch>
+                <a:fillRect/>
+              </a:stretch>
+            </p:blipFill>
+            <p:spPr>
+              <a:xfrm>
+                <a:off x="6977140" y="4626620"/>
+                <a:ext cx="2670120" cy="2423520"/>
+              </a:xfrm>
+              <a:prstGeom prst="rect">
+                <a:avLst/>
+              </a:prstGeom>
+            </p:spPr>
+          </p:pic>
+        </mc:Fallback>
+      </mc:AlternateContent>
+    </p:spTree>
+    <p:extLst>
+      <p:ext uri="{BB962C8B-B14F-4D97-AF65-F5344CB8AC3E}">
+        <p14:creationId xmlns:p14="http://schemas.microsoft.com/office/powerpoint/2010/main" val="410000195"/>
+      </p:ext>
+    </p:extLst>
+  </p:cSld>
+  <p:clrMapOvr>
+    <a:masterClrMapping/>
+  </p:clrMapOvr>
+  <p:timing>
+    <p:tnLst>
+      <p:par>
+        <p:cTn id="1" dur="indefinite" restart="never" nodeType="tmRoot">
+          <p:childTnLst>
+            <p:seq concurrent="1" nextAc="seek">
+              <p:cTn id="2" dur="indefinite" nodeType="mainSeq">
+                <p:childTnLst>
+                  <p:par>
+                    <p:cTn id="3" fill="hold">
+                      <p:stCondLst>
+                        <p:cond delay="indefinite"/>
+                      </p:stCondLst>
+                      <p:childTnLst>
+                        <p:par>
+                          <p:cTn id="4" fill="hold">
+                            <p:stCondLst>
+                              <p:cond delay="0"/>
+                            </p:stCondLst>
+                            <p:childTnLst>
+                              <p:par>
+                                <p:cTn id="5" presetID="9" presetClass="entr" presetSubtype="0" fill="hold" grpId="0" nodeType="clickEffect">
+                                  <p:stCondLst>
+                                    <p:cond delay="0"/>
+                                  </p:stCondLst>
+                                  <p:childTnLst>
+                                    <p:set>
+                                      <p:cBhvr>
+                                        <p:cTn id="6" dur="1" fill="hold">
+                                          <p:stCondLst>
+                                            <p:cond delay="0"/>
+                                          </p:stCondLst>
+                                        </p:cTn>
+                                        <p:tgtEl>
+                                          <p:spTgt spid="2"/>
+                                        </p:tgtEl>
+                                        <p:attrNameLst>
+                                          <p:attrName>style.visibility</p:attrName>
+                                        </p:attrNameLst>
+                                      </p:cBhvr>
+                                      <p:to>
+                                        <p:strVal val="visible"/>
+                                      </p:to>
+                                    </p:set>
+                                    <p:animEffect transition="in" filter="dissolve">
+                                      <p:cBhvr>
+                                        <p:cTn id="7" dur="500"/>
+                                        <p:tgtEl>
+                                          <p:spTgt spid="2"/>
+                                        </p:tgtEl>
+                                      </p:cBhvr>
+                                    </p:animEffect>
+                                  </p:childTnLst>
+                                </p:cTn>
+                              </p:par>
+                              <p:par>
+                                <p:cTn id="8" presetID="9" presetClass="entr" presetSubtype="0" fill="hold" nodeType="withEffect">
+                                  <p:stCondLst>
+                                    <p:cond delay="0"/>
+                                  </p:stCondLst>
+                                  <p:childTnLst>
+                                    <p:set>
+                                      <p:cBhvr>
+                                        <p:cTn id="9" dur="1" fill="hold">
+                                          <p:stCondLst>
+                                            <p:cond delay="0"/>
+                                          </p:stCondLst>
+                                        </p:cTn>
+                                        <p:tgtEl>
+                                          <p:spTgt spid="6"/>
+                                        </p:tgtEl>
+                                        <p:attrNameLst>
+                                          <p:attrName>style.visibility</p:attrName>
+                                        </p:attrNameLst>
+                                      </p:cBhvr>
+                                      <p:to>
+                                        <p:strVal val="visible"/>
+                                      </p:to>
+                                    </p:set>
+                                    <p:animEffect transition="in" filter="dissolve">
+                                      <p:cBhvr>
+                                        <p:cTn id="10" dur="500"/>
+                                        <p:tgtEl>
+                                          <p:spTgt spid="6"/>
+                                        </p:tgtEl>
+                                      </p:cBhvr>
+                                    </p:animEffect>
+                                  </p:childTnLst>
+                                </p:cTn>
+                              </p:par>
+                            </p:childTnLst>
+                          </p:cTn>
+                        </p:par>
+                      </p:childTnLst>
+                    </p:cTn>
+                  </p:par>
+                  <p:par>
+                    <p:cTn id="11" fill="hold">
+                      <p:stCondLst>
+                        <p:cond delay="indefinite"/>
+                      </p:stCondLst>
+                      <p:childTnLst>
+                        <p:par>
+                          <p:cTn id="12" fill="hold">
+                            <p:stCondLst>
+                              <p:cond delay="0"/>
+                            </p:stCondLst>
+                            <p:childTnLst>
+                              <p:par>
+                                <p:cTn id="13" presetID="9" presetClass="entr" presetSubtype="0" fill="hold" nodeType="clickEffect">
+                                  <p:stCondLst>
+                                    <p:cond delay="0"/>
+                                  </p:stCondLst>
+                                  <p:childTnLst>
+                                    <p:set>
+                                      <p:cBhvr>
+                                        <p:cTn id="14" dur="1" fill="hold">
+                                          <p:stCondLst>
+                                            <p:cond delay="0"/>
+                                          </p:stCondLst>
+                                        </p:cTn>
+                                        <p:tgtEl>
+                                          <p:spTgt spid="20"/>
+                                        </p:tgtEl>
+                                        <p:attrNameLst>
+                                          <p:attrName>style.visibility</p:attrName>
+                                        </p:attrNameLst>
+                                      </p:cBhvr>
+                                      <p:to>
+                                        <p:strVal val="visible"/>
+                                      </p:to>
+                                    </p:set>
+                                    <p:animEffect transition="in" filter="dissolve">
+                                      <p:cBhvr>
+                                        <p:cTn id="15" dur="1000"/>
+                                        <p:tgtEl>
+                                          <p:spTgt spid="20"/>
+                                        </p:tgtEl>
+                                      </p:cBhvr>
+                                    </p:animEffect>
+                                  </p:childTnLst>
+                                </p:cTn>
+                              </p:par>
+                            </p:childTnLst>
+                          </p:cTn>
+                        </p:par>
+                      </p:childTnLst>
+                    </p:cTn>
+                  </p:par>
+                </p:childTnLst>
+              </p:cTn>
+              <p:prevCondLst>
+                <p:cond evt="onPrev" delay="0">
+                  <p:tgtEl>
+                    <p:sldTgt/>
+                  </p:tgtEl>
+                </p:cond>
+              </p:prevCondLst>
+              <p:nextCondLst>
+                <p:cond evt="onNext" delay="0">
+                  <p:tgtEl>
+                    <p:sldTgt/>
+                  </p:tgtEl>
+                </p:cond>
+              </p:nextCondLst>
+            </p:seq>
+          </p:childTnLst>
+        </p:cTn>
+      </p:par>
+    </p:tnLst>
+    <p:bldLst>
+      <p:bldP spid="2" grpId="0"/>
+    </p:bldLst>
   </p:timing>
 </p:sld>
 </file>

</xml_diff>